<commit_message>
changed the names of the pipeline sections
</commit_message>
<xml_diff>
--- a/nservicebus/azure-service-bus/Scopes.pptx
+++ b/nservicebus/azure-service-bus/Scopes.pptx
@@ -243,7 +243,7 @@
           <a:p>
             <a:fld id="{B16937A6-3F9C-48AA-A395-6B270EACA695}" type="datetimeFigureOut">
               <a:rPr lang="en-US" smtClean="0"/>
-              <a:t>8/12/2016</a:t>
+              <a:t>4/25/2017</a:t>
             </a:fld>
             <a:endParaRPr lang="en-US"/>
           </a:p>
@@ -411,7 +411,7 @@
           <a:p>
             <a:fld id="{B16937A6-3F9C-48AA-A395-6B270EACA695}" type="datetimeFigureOut">
               <a:rPr lang="en-US" smtClean="0"/>
-              <a:t>8/12/2016</a:t>
+              <a:t>4/25/2017</a:t>
             </a:fld>
             <a:endParaRPr lang="en-US"/>
           </a:p>
@@ -589,7 +589,7 @@
           <a:p>
             <a:fld id="{B16937A6-3F9C-48AA-A395-6B270EACA695}" type="datetimeFigureOut">
               <a:rPr lang="en-US" smtClean="0"/>
-              <a:t>8/12/2016</a:t>
+              <a:t>4/25/2017</a:t>
             </a:fld>
             <a:endParaRPr lang="en-US"/>
           </a:p>
@@ -757,7 +757,7 @@
           <a:p>
             <a:fld id="{B16937A6-3F9C-48AA-A395-6B270EACA695}" type="datetimeFigureOut">
               <a:rPr lang="en-US" smtClean="0"/>
-              <a:t>8/12/2016</a:t>
+              <a:t>4/25/2017</a:t>
             </a:fld>
             <a:endParaRPr lang="en-US"/>
           </a:p>
@@ -1002,7 +1002,7 @@
           <a:p>
             <a:fld id="{B16937A6-3F9C-48AA-A395-6B270EACA695}" type="datetimeFigureOut">
               <a:rPr lang="en-US" smtClean="0"/>
-              <a:t>8/12/2016</a:t>
+              <a:t>4/25/2017</a:t>
             </a:fld>
             <a:endParaRPr lang="en-US"/>
           </a:p>
@@ -1231,7 +1231,7 @@
           <a:p>
             <a:fld id="{B16937A6-3F9C-48AA-A395-6B270EACA695}" type="datetimeFigureOut">
               <a:rPr lang="en-US" smtClean="0"/>
-              <a:t>8/12/2016</a:t>
+              <a:t>4/25/2017</a:t>
             </a:fld>
             <a:endParaRPr lang="en-US"/>
           </a:p>
@@ -1595,7 +1595,7 @@
           <a:p>
             <a:fld id="{B16937A6-3F9C-48AA-A395-6B270EACA695}" type="datetimeFigureOut">
               <a:rPr lang="en-US" smtClean="0"/>
-              <a:t>8/12/2016</a:t>
+              <a:t>4/25/2017</a:t>
             </a:fld>
             <a:endParaRPr lang="en-US"/>
           </a:p>
@@ -1712,7 +1712,7 @@
           <a:p>
             <a:fld id="{B16937A6-3F9C-48AA-A395-6B270EACA695}" type="datetimeFigureOut">
               <a:rPr lang="en-US" smtClean="0"/>
-              <a:t>8/12/2016</a:t>
+              <a:t>4/25/2017</a:t>
             </a:fld>
             <a:endParaRPr lang="en-US"/>
           </a:p>
@@ -1807,7 +1807,7 @@
           <a:p>
             <a:fld id="{B16937A6-3F9C-48AA-A395-6B270EACA695}" type="datetimeFigureOut">
               <a:rPr lang="en-US" smtClean="0"/>
-              <a:t>8/12/2016</a:t>
+              <a:t>4/25/2017</a:t>
             </a:fld>
             <a:endParaRPr lang="en-US"/>
           </a:p>
@@ -2082,7 +2082,7 @@
           <a:p>
             <a:fld id="{B16937A6-3F9C-48AA-A395-6B270EACA695}" type="datetimeFigureOut">
               <a:rPr lang="en-US" smtClean="0"/>
-              <a:t>8/12/2016</a:t>
+              <a:t>4/25/2017</a:t>
             </a:fld>
             <a:endParaRPr lang="en-US"/>
           </a:p>
@@ -2334,7 +2334,7 @@
           <a:p>
             <a:fld id="{B16937A6-3F9C-48AA-A395-6B270EACA695}" type="datetimeFigureOut">
               <a:rPr lang="en-US" smtClean="0"/>
-              <a:t>8/12/2016</a:t>
+              <a:t>4/25/2017</a:t>
             </a:fld>
             <a:endParaRPr lang="en-US"/>
           </a:p>
@@ -2545,7 +2545,7 @@
           <a:p>
             <a:fld id="{B16937A6-3F9C-48AA-A395-6B270EACA695}" type="datetimeFigureOut">
               <a:rPr lang="en-US" smtClean="0"/>
-              <a:t>8/12/2016</a:t>
+              <a:t>4/25/2017</a:t>
             </a:fld>
             <a:endParaRPr lang="en-US"/>
           </a:p>
@@ -4264,10 +4264,17 @@
           <a:p>
             <a:pPr algn="ctr"/>
             <a:r>
-              <a:rPr lang="nl-BE" dirty="0"/>
-              <a:t>Pipeline</a:t>
-            </a:r>
-            <a:endParaRPr lang="en-US" dirty="0"/>
+              <a:rPr lang="nl-BE" sz="1400" dirty="0"/>
+              <a:t>Handler Pipeline</a:t>
+            </a:r>
+          </a:p>
+          <a:p>
+            <a:pPr algn="ctr"/>
+            <a:r>
+              <a:rPr lang="nl-BE" sz="1400" dirty="0"/>
+              <a:t>Section</a:t>
+            </a:r>
+            <a:endParaRPr lang="en-US" sz="1400" dirty="0"/>
           </a:p>
         </p:txBody>
       </p:sp>
@@ -4390,10 +4397,10 @@
           <a:p>
             <a:pPr algn="ctr"/>
             <a:r>
-              <a:rPr lang="nl-BE" dirty="0"/>
-              <a:t>Pipeline</a:t>
-            </a:r>
-            <a:endParaRPr lang="en-US" dirty="0"/>
+              <a:rPr lang="nl-BE" sz="1400" dirty="0"/>
+              <a:t>Incoming Pipeline section</a:t>
+            </a:r>
+            <a:endParaRPr lang="en-US" sz="1400" dirty="0"/>
           </a:p>
         </p:txBody>
       </p:sp>
@@ -4476,10 +4483,10 @@
           <a:p>
             <a:pPr algn="ctr"/>
             <a:r>
-              <a:rPr lang="nl-BE" dirty="0"/>
-              <a:t>Pipeline</a:t>
-            </a:r>
-            <a:endParaRPr lang="en-US" dirty="0"/>
+              <a:rPr lang="nl-BE" sz="1400" dirty="0"/>
+              <a:t>Outgoing Pipeline Section</a:t>
+            </a:r>
+            <a:endParaRPr lang="en-US" sz="1400" dirty="0"/>
           </a:p>
         </p:txBody>
       </p:sp>

</xml_diff>

<commit_message>
rewritten the document, hope it makes more sense now
</commit_message>
<xml_diff>
--- a/nservicebus/azure-service-bus/Scopes.pptx
+++ b/nservicebus/azure-service-bus/Scopes.pptx
@@ -7,7 +7,8 @@
   <p:sldIdLst>
     <p:sldId id="256" r:id="rId2"/>
     <p:sldId id="257" r:id="rId3"/>
-    <p:sldId id="258" r:id="rId4"/>
+    <p:sldId id="259" r:id="rId4"/>
+    <p:sldId id="258" r:id="rId5"/>
   </p:sldIdLst>
   <p:sldSz cx="12192000" cy="6858000"/>
   <p:notesSz cx="6858000" cy="9144000"/>
@@ -114,6 +115,10 @@
 </p:presentation>
 </file>
 
+<file path=ppt/revisionInfo.xml><?xml version="1.0" encoding="utf-8"?>
+<p1510:revInfo xmlns:a="http://schemas.openxmlformats.org/drawingml/2006/main" xmlns:r="http://schemas.openxmlformats.org/officeDocument/2006/relationships" xmlns:p1510="http://schemas.microsoft.com/office/powerpoint/2015/10/main"/>
+</file>
+
 <file path=ppt/slideLayouts/slideLayout1.xml><?xml version="1.0" encoding="utf-8"?>
 <p:sldLayout xmlns:a="http://schemas.openxmlformats.org/drawingml/2006/main" xmlns:r="http://schemas.openxmlformats.org/officeDocument/2006/relationships" xmlns:p="http://schemas.openxmlformats.org/presentationml/2006/main" type="title" preserve="1">
   <p:cSld name="Title Slide">
@@ -243,7 +248,7 @@
           <a:p>
             <a:fld id="{B16937A6-3F9C-48AA-A395-6B270EACA695}" type="datetimeFigureOut">
               <a:rPr lang="en-US" smtClean="0"/>
-              <a:t>4/25/2017</a:t>
+              <a:t>5/8/2017</a:t>
             </a:fld>
             <a:endParaRPr lang="en-US"/>
           </a:p>
@@ -411,7 +416,7 @@
           <a:p>
             <a:fld id="{B16937A6-3F9C-48AA-A395-6B270EACA695}" type="datetimeFigureOut">
               <a:rPr lang="en-US" smtClean="0"/>
-              <a:t>4/25/2017</a:t>
+              <a:t>5/8/2017</a:t>
             </a:fld>
             <a:endParaRPr lang="en-US"/>
           </a:p>
@@ -589,7 +594,7 @@
           <a:p>
             <a:fld id="{B16937A6-3F9C-48AA-A395-6B270EACA695}" type="datetimeFigureOut">
               <a:rPr lang="en-US" smtClean="0"/>
-              <a:t>4/25/2017</a:t>
+              <a:t>5/8/2017</a:t>
             </a:fld>
             <a:endParaRPr lang="en-US"/>
           </a:p>
@@ -757,7 +762,7 @@
           <a:p>
             <a:fld id="{B16937A6-3F9C-48AA-A395-6B270EACA695}" type="datetimeFigureOut">
               <a:rPr lang="en-US" smtClean="0"/>
-              <a:t>4/25/2017</a:t>
+              <a:t>5/8/2017</a:t>
             </a:fld>
             <a:endParaRPr lang="en-US"/>
           </a:p>
@@ -1002,7 +1007,7 @@
           <a:p>
             <a:fld id="{B16937A6-3F9C-48AA-A395-6B270EACA695}" type="datetimeFigureOut">
               <a:rPr lang="en-US" smtClean="0"/>
-              <a:t>4/25/2017</a:t>
+              <a:t>5/8/2017</a:t>
             </a:fld>
             <a:endParaRPr lang="en-US"/>
           </a:p>
@@ -1231,7 +1236,7 @@
           <a:p>
             <a:fld id="{B16937A6-3F9C-48AA-A395-6B270EACA695}" type="datetimeFigureOut">
               <a:rPr lang="en-US" smtClean="0"/>
-              <a:t>4/25/2017</a:t>
+              <a:t>5/8/2017</a:t>
             </a:fld>
             <a:endParaRPr lang="en-US"/>
           </a:p>
@@ -1595,7 +1600,7 @@
           <a:p>
             <a:fld id="{B16937A6-3F9C-48AA-A395-6B270EACA695}" type="datetimeFigureOut">
               <a:rPr lang="en-US" smtClean="0"/>
-              <a:t>4/25/2017</a:t>
+              <a:t>5/8/2017</a:t>
             </a:fld>
             <a:endParaRPr lang="en-US"/>
           </a:p>
@@ -1712,7 +1717,7 @@
           <a:p>
             <a:fld id="{B16937A6-3F9C-48AA-A395-6B270EACA695}" type="datetimeFigureOut">
               <a:rPr lang="en-US" smtClean="0"/>
-              <a:t>4/25/2017</a:t>
+              <a:t>5/8/2017</a:t>
             </a:fld>
             <a:endParaRPr lang="en-US"/>
           </a:p>
@@ -1807,7 +1812,7 @@
           <a:p>
             <a:fld id="{B16937A6-3F9C-48AA-A395-6B270EACA695}" type="datetimeFigureOut">
               <a:rPr lang="en-US" smtClean="0"/>
-              <a:t>4/25/2017</a:t>
+              <a:t>5/8/2017</a:t>
             </a:fld>
             <a:endParaRPr lang="en-US"/>
           </a:p>
@@ -2082,7 +2087,7 @@
           <a:p>
             <a:fld id="{B16937A6-3F9C-48AA-A395-6B270EACA695}" type="datetimeFigureOut">
               <a:rPr lang="en-US" smtClean="0"/>
-              <a:t>4/25/2017</a:t>
+              <a:t>5/8/2017</a:t>
             </a:fld>
             <a:endParaRPr lang="en-US"/>
           </a:p>
@@ -2334,7 +2339,7 @@
           <a:p>
             <a:fld id="{B16937A6-3F9C-48AA-A395-6B270EACA695}" type="datetimeFigureOut">
               <a:rPr lang="en-US" smtClean="0"/>
-              <a:t>4/25/2017</a:t>
+              <a:t>5/8/2017</a:t>
             </a:fld>
             <a:endParaRPr lang="en-US"/>
           </a:p>
@@ -2545,7 +2550,7 @@
           <a:p>
             <a:fld id="{B16937A6-3F9C-48AA-A395-6B270EACA695}" type="datetimeFigureOut">
               <a:rPr lang="en-US" smtClean="0"/>
-              <a:t>4/25/2017</a:t>
+              <a:t>5/8/2017</a:t>
             </a:fld>
             <a:endParaRPr lang="en-US"/>
           </a:p>
@@ -4268,14 +4273,6 @@
               <a:t>Handler Pipeline</a:t>
             </a:r>
           </a:p>
-          <a:p>
-            <a:pPr algn="ctr"/>
-            <a:r>
-              <a:rPr lang="nl-BE" sz="1400" dirty="0"/>
-              <a:t>Section</a:t>
-            </a:r>
-            <a:endParaRPr lang="en-US" sz="1400" dirty="0"/>
-          </a:p>
         </p:txBody>
       </p:sp>
       <p:sp>
@@ -4398,7 +4395,7 @@
             <a:pPr algn="ctr"/>
             <a:r>
               <a:rPr lang="nl-BE" sz="1400" dirty="0"/>
-              <a:t>Incoming Pipeline section</a:t>
+              <a:t>Incoming Pipeline</a:t>
             </a:r>
             <a:endParaRPr lang="en-US" sz="1400" dirty="0"/>
           </a:p>
@@ -4484,7 +4481,7 @@
             <a:pPr algn="ctr"/>
             <a:r>
               <a:rPr lang="nl-BE" sz="1400" dirty="0"/>
-              <a:t>Outgoing Pipeline Section</a:t>
+              <a:t>Outgoing Pipeline</a:t>
             </a:r>
             <a:endParaRPr lang="en-US" sz="1400" dirty="0"/>
           </a:p>
@@ -4542,7 +4539,7 @@
         </p:nvSpPr>
         <p:spPr>
           <a:xfrm>
-            <a:off x="6284830" y="2743888"/>
+            <a:off x="6586798" y="2743888"/>
             <a:ext cx="374469" cy="1119052"/>
           </a:xfrm>
           <a:prstGeom prst="leftBrace">
@@ -4865,7 +4862,7 @@
         </p:nvSpPr>
         <p:spPr>
           <a:xfrm>
-            <a:off x="6729315" y="2344962"/>
+            <a:off x="6888701" y="2344962"/>
             <a:ext cx="931665" cy="646331"/>
           </a:xfrm>
           <a:prstGeom prst="rect">
@@ -5276,6 +5273,1091 @@
 </file>
 
 <file path=ppt/slides/slide3.xml><?xml version="1.0" encoding="utf-8"?>
+<p:sld xmlns:a="http://schemas.openxmlformats.org/drawingml/2006/main" xmlns:r="http://schemas.openxmlformats.org/officeDocument/2006/relationships" xmlns:p="http://schemas.openxmlformats.org/presentationml/2006/main">
+  <p:cSld>
+    <p:spTree>
+      <p:nvGrpSpPr>
+        <p:cNvPr id="1" name=""/>
+        <p:cNvGrpSpPr/>
+        <p:nvPr/>
+      </p:nvGrpSpPr>
+      <p:grpSpPr>
+        <a:xfrm>
+          <a:off x="0" y="0"/>
+          <a:ext cx="0" cy="0"/>
+          <a:chOff x="0" y="0"/>
+          <a:chExt cx="0" cy="0"/>
+        </a:xfrm>
+      </p:grpSpPr>
+      <p:sp>
+        <p:nvSpPr>
+          <p:cNvPr id="22" name="Rectangle 21"/>
+          <p:cNvSpPr/>
+          <p:nvPr/>
+        </p:nvSpPr>
+        <p:spPr>
+          <a:xfrm>
+            <a:off x="6931293" y="3088595"/>
+            <a:ext cx="1280160" cy="610850"/>
+          </a:xfrm>
+          <a:prstGeom prst="rect">
+            <a:avLst/>
+          </a:prstGeom>
+        </p:spPr>
+        <p:style>
+          <a:lnRef idx="2">
+            <a:schemeClr val="accent1">
+              <a:shade val="50000"/>
+            </a:schemeClr>
+          </a:lnRef>
+          <a:fillRef idx="1">
+            <a:schemeClr val="accent1"/>
+          </a:fillRef>
+          <a:effectRef idx="0">
+            <a:schemeClr val="accent1"/>
+          </a:effectRef>
+          <a:fontRef idx="minor">
+            <a:schemeClr val="lt1"/>
+          </a:fontRef>
+        </p:style>
+        <p:txBody>
+          <a:bodyPr rtlCol="0" anchor="ctr"/>
+          <a:lstStyle/>
+          <a:p>
+            <a:pPr algn="ctr"/>
+            <a:r>
+              <a:rPr lang="nl-BE" sz="1400" dirty="0"/>
+              <a:t>Handler Pipeline</a:t>
+            </a:r>
+          </a:p>
+        </p:txBody>
+      </p:sp>
+      <p:sp>
+        <p:nvSpPr>
+          <p:cNvPr id="4" name="Rectangle 3"/>
+          <p:cNvSpPr/>
+          <p:nvPr/>
+        </p:nvSpPr>
+        <p:spPr>
+          <a:xfrm>
+            <a:off x="2664823" y="3091544"/>
+            <a:ext cx="1410788" cy="609600"/>
+          </a:xfrm>
+          <a:prstGeom prst="rect">
+            <a:avLst/>
+          </a:prstGeom>
+        </p:spPr>
+        <p:style>
+          <a:lnRef idx="2">
+            <a:schemeClr val="accent1">
+              <a:shade val="50000"/>
+            </a:schemeClr>
+          </a:lnRef>
+          <a:fillRef idx="1">
+            <a:schemeClr val="accent1"/>
+          </a:fillRef>
+          <a:effectRef idx="0">
+            <a:schemeClr val="accent1"/>
+          </a:effectRef>
+          <a:fontRef idx="minor">
+            <a:schemeClr val="lt1"/>
+          </a:fontRef>
+        </p:style>
+        <p:txBody>
+          <a:bodyPr rtlCol="0" anchor="ctr"/>
+          <a:lstStyle/>
+          <a:p>
+            <a:pPr algn="ctr"/>
+            <a:r>
+              <a:rPr lang="nl-BE" dirty="0"/>
+              <a:t>Transport</a:t>
+            </a:r>
+            <a:endParaRPr lang="en-US" dirty="0"/>
+          </a:p>
+        </p:txBody>
+      </p:sp>
+      <p:sp>
+        <p:nvSpPr>
+          <p:cNvPr id="5" name="Left Brace 4"/>
+          <p:cNvSpPr/>
+          <p:nvPr/>
+        </p:nvSpPr>
+        <p:spPr>
+          <a:xfrm>
+            <a:off x="3796937" y="2582092"/>
+            <a:ext cx="374469" cy="2466821"/>
+          </a:xfrm>
+          <a:prstGeom prst="leftBrace">
+            <a:avLst/>
+          </a:prstGeom>
+        </p:spPr>
+        <p:style>
+          <a:lnRef idx="3">
+            <a:schemeClr val="dk1"/>
+          </a:lnRef>
+          <a:fillRef idx="0">
+            <a:schemeClr val="dk1"/>
+          </a:fillRef>
+          <a:effectRef idx="2">
+            <a:schemeClr val="dk1"/>
+          </a:effectRef>
+          <a:fontRef idx="minor">
+            <a:schemeClr val="tx1"/>
+          </a:fontRef>
+        </p:style>
+        <p:txBody>
+          <a:bodyPr rtlCol="0" anchor="ctr"/>
+          <a:lstStyle/>
+          <a:p>
+            <a:pPr algn="ctr"/>
+            <a:endParaRPr lang="en-US"/>
+          </a:p>
+        </p:txBody>
+      </p:sp>
+      <p:sp>
+        <p:nvSpPr>
+          <p:cNvPr id="6" name="Rectangle 5"/>
+          <p:cNvSpPr/>
+          <p:nvPr/>
+        </p:nvSpPr>
+        <p:spPr>
+          <a:xfrm>
+            <a:off x="4171406" y="3091544"/>
+            <a:ext cx="2664092" cy="609600"/>
+          </a:xfrm>
+          <a:prstGeom prst="rect">
+            <a:avLst/>
+          </a:prstGeom>
+        </p:spPr>
+        <p:style>
+          <a:lnRef idx="2">
+            <a:schemeClr val="accent1">
+              <a:shade val="50000"/>
+            </a:schemeClr>
+          </a:lnRef>
+          <a:fillRef idx="1">
+            <a:schemeClr val="accent1"/>
+          </a:fillRef>
+          <a:effectRef idx="0">
+            <a:schemeClr val="accent1"/>
+          </a:effectRef>
+          <a:fontRef idx="minor">
+            <a:schemeClr val="lt1"/>
+          </a:fontRef>
+        </p:style>
+        <p:txBody>
+          <a:bodyPr rtlCol="0" anchor="ctr"/>
+          <a:lstStyle/>
+          <a:p>
+            <a:pPr algn="ctr"/>
+            <a:r>
+              <a:rPr lang="nl-BE" sz="1400" dirty="0"/>
+              <a:t>Incoming Pipeline</a:t>
+            </a:r>
+            <a:endParaRPr lang="en-US" sz="1400" dirty="0"/>
+          </a:p>
+        </p:txBody>
+      </p:sp>
+      <p:sp>
+        <p:nvSpPr>
+          <p:cNvPr id="7" name="Rectangle 6"/>
+          <p:cNvSpPr/>
+          <p:nvPr/>
+        </p:nvSpPr>
+        <p:spPr>
+          <a:xfrm>
+            <a:off x="8291297" y="3091544"/>
+            <a:ext cx="1410788" cy="609600"/>
+          </a:xfrm>
+          <a:prstGeom prst="rect">
+            <a:avLst/>
+          </a:prstGeom>
+        </p:spPr>
+        <p:style>
+          <a:lnRef idx="2">
+            <a:schemeClr val="accent1"/>
+          </a:lnRef>
+          <a:fillRef idx="1">
+            <a:schemeClr val="lt1"/>
+          </a:fillRef>
+          <a:effectRef idx="0">
+            <a:schemeClr val="accent1"/>
+          </a:effectRef>
+          <a:fontRef idx="minor">
+            <a:schemeClr val="dk1"/>
+          </a:fontRef>
+        </p:style>
+        <p:txBody>
+          <a:bodyPr rtlCol="0" anchor="ctr"/>
+          <a:lstStyle/>
+          <a:p>
+            <a:pPr algn="ctr"/>
+            <a:r>
+              <a:rPr lang="nl-BE" dirty="0"/>
+              <a:t>User Code</a:t>
+            </a:r>
+            <a:endParaRPr lang="en-US" dirty="0"/>
+          </a:p>
+        </p:txBody>
+      </p:sp>
+      <p:sp>
+        <p:nvSpPr>
+          <p:cNvPr id="8" name="Rectangle 7"/>
+          <p:cNvSpPr/>
+          <p:nvPr/>
+        </p:nvSpPr>
+        <p:spPr>
+          <a:xfrm>
+            <a:off x="6931293" y="3951732"/>
+            <a:ext cx="1385398" cy="609600"/>
+          </a:xfrm>
+          <a:prstGeom prst="rect">
+            <a:avLst/>
+          </a:prstGeom>
+        </p:spPr>
+        <p:style>
+          <a:lnRef idx="2">
+            <a:schemeClr val="accent1">
+              <a:shade val="50000"/>
+            </a:schemeClr>
+          </a:lnRef>
+          <a:fillRef idx="1">
+            <a:schemeClr val="accent1"/>
+          </a:fillRef>
+          <a:effectRef idx="0">
+            <a:schemeClr val="accent1"/>
+          </a:effectRef>
+          <a:fontRef idx="minor">
+            <a:schemeClr val="lt1"/>
+          </a:fontRef>
+        </p:style>
+        <p:txBody>
+          <a:bodyPr rtlCol="0" anchor="ctr"/>
+          <a:lstStyle/>
+          <a:p>
+            <a:pPr algn="ctr"/>
+            <a:r>
+              <a:rPr lang="nl-BE" sz="1400" dirty="0"/>
+              <a:t>Outgoing Pipeline</a:t>
+            </a:r>
+            <a:endParaRPr lang="en-US" sz="1400" dirty="0"/>
+          </a:p>
+        </p:txBody>
+      </p:sp>
+      <p:sp>
+        <p:nvSpPr>
+          <p:cNvPr id="9" name="Rectangle 8"/>
+          <p:cNvSpPr/>
+          <p:nvPr/>
+        </p:nvSpPr>
+        <p:spPr>
+          <a:xfrm>
+            <a:off x="8360232" y="3941321"/>
+            <a:ext cx="1410788" cy="609600"/>
+          </a:xfrm>
+          <a:prstGeom prst="rect">
+            <a:avLst/>
+          </a:prstGeom>
+        </p:spPr>
+        <p:style>
+          <a:lnRef idx="2">
+            <a:schemeClr val="accent1">
+              <a:shade val="50000"/>
+            </a:schemeClr>
+          </a:lnRef>
+          <a:fillRef idx="1">
+            <a:schemeClr val="accent1"/>
+          </a:fillRef>
+          <a:effectRef idx="0">
+            <a:schemeClr val="accent1"/>
+          </a:effectRef>
+          <a:fontRef idx="minor">
+            <a:schemeClr val="lt1"/>
+          </a:fontRef>
+        </p:style>
+        <p:txBody>
+          <a:bodyPr rtlCol="0" anchor="ctr"/>
+          <a:lstStyle/>
+          <a:p>
+            <a:pPr algn="ctr"/>
+            <a:r>
+              <a:rPr lang="nl-BE" dirty="0"/>
+              <a:t>Transport</a:t>
+            </a:r>
+            <a:endParaRPr lang="en-US" dirty="0"/>
+          </a:p>
+        </p:txBody>
+      </p:sp>
+      <p:sp>
+        <p:nvSpPr>
+          <p:cNvPr id="10" name="Left Brace 9"/>
+          <p:cNvSpPr/>
+          <p:nvPr/>
+        </p:nvSpPr>
+        <p:spPr>
+          <a:xfrm rot="5400000">
+            <a:off x="4576204" y="3491425"/>
+            <a:ext cx="374469" cy="1119052"/>
+          </a:xfrm>
+          <a:prstGeom prst="leftBrace">
+            <a:avLst/>
+          </a:prstGeom>
+        </p:spPr>
+        <p:style>
+          <a:lnRef idx="3">
+            <a:schemeClr val="dk1"/>
+          </a:lnRef>
+          <a:fillRef idx="0">
+            <a:schemeClr val="dk1"/>
+          </a:fillRef>
+          <a:effectRef idx="2">
+            <a:schemeClr val="dk1"/>
+          </a:effectRef>
+          <a:fontRef idx="minor">
+            <a:schemeClr val="tx1"/>
+          </a:fontRef>
+        </p:style>
+        <p:txBody>
+          <a:bodyPr rtlCol="0" anchor="ctr"/>
+          <a:lstStyle/>
+          <a:p>
+            <a:pPr algn="ctr"/>
+            <a:endParaRPr lang="en-US"/>
+          </a:p>
+        </p:txBody>
+      </p:sp>
+      <p:grpSp>
+        <p:nvGrpSpPr>
+          <p:cNvPr id="11" name="Group 10"/>
+          <p:cNvGrpSpPr/>
+          <p:nvPr/>
+        </p:nvGrpSpPr>
+        <p:grpSpPr>
+          <a:xfrm>
+            <a:off x="9216281" y="4493957"/>
+            <a:ext cx="1196560" cy="369332"/>
+            <a:chOff x="8342811" y="5373189"/>
+            <a:chExt cx="1196560" cy="369332"/>
+          </a:xfrm>
+        </p:grpSpPr>
+        <p:sp>
+          <p:nvSpPr>
+            <p:cNvPr id="12" name="Star: 5 Points 11"/>
+            <p:cNvSpPr/>
+            <p:nvPr/>
+          </p:nvSpPr>
+          <p:spPr>
+            <a:xfrm>
+              <a:off x="8342811" y="5448997"/>
+              <a:ext cx="226423" cy="217715"/>
+            </a:xfrm>
+            <a:prstGeom prst="star5">
+              <a:avLst/>
+            </a:prstGeom>
+          </p:spPr>
+          <p:style>
+            <a:lnRef idx="0">
+              <a:schemeClr val="accent4"/>
+            </a:lnRef>
+            <a:fillRef idx="3">
+              <a:schemeClr val="accent4"/>
+            </a:fillRef>
+            <a:effectRef idx="3">
+              <a:schemeClr val="accent4"/>
+            </a:effectRef>
+            <a:fontRef idx="minor">
+              <a:schemeClr val="lt1"/>
+            </a:fontRef>
+          </p:style>
+          <p:txBody>
+            <a:bodyPr rtlCol="0" anchor="ctr"/>
+            <a:lstStyle/>
+            <a:p>
+              <a:pPr algn="ctr"/>
+              <a:endParaRPr lang="en-US" dirty="0"/>
+            </a:p>
+          </p:txBody>
+        </p:sp>
+        <p:sp>
+          <p:nvSpPr>
+            <p:cNvPr id="13" name="TextBox 12"/>
+            <p:cNvSpPr txBox="1"/>
+            <p:nvPr/>
+          </p:nvSpPr>
+          <p:spPr>
+            <a:xfrm>
+              <a:off x="8569234" y="5373189"/>
+              <a:ext cx="970137" cy="369332"/>
+            </a:xfrm>
+            <a:prstGeom prst="rect">
+              <a:avLst/>
+            </a:prstGeom>
+            <a:noFill/>
+          </p:spPr>
+          <p:txBody>
+            <a:bodyPr wrap="none" rtlCol="0">
+              <a:spAutoFit/>
+            </a:bodyPr>
+            <a:lstStyle/>
+            <a:p>
+              <a:r>
+                <a:rPr lang="nl-BE" dirty="0"/>
+                <a:t>Send via</a:t>
+              </a:r>
+              <a:endParaRPr lang="en-US" dirty="0"/>
+            </a:p>
+          </p:txBody>
+        </p:sp>
+      </p:grpSp>
+      <p:grpSp>
+        <p:nvGrpSpPr>
+          <p:cNvPr id="14" name="Group 13"/>
+          <p:cNvGrpSpPr/>
+          <p:nvPr/>
+        </p:nvGrpSpPr>
+        <p:grpSpPr>
+          <a:xfrm>
+            <a:off x="4151746" y="4678624"/>
+            <a:ext cx="1319479" cy="369332"/>
+            <a:chOff x="8342811" y="5373189"/>
+            <a:chExt cx="1319479" cy="369332"/>
+          </a:xfrm>
+        </p:grpSpPr>
+        <p:sp>
+          <p:nvSpPr>
+            <p:cNvPr id="15" name="Star: 5 Points 14"/>
+            <p:cNvSpPr/>
+            <p:nvPr/>
+          </p:nvSpPr>
+          <p:spPr>
+            <a:xfrm>
+              <a:off x="8342811" y="5448997"/>
+              <a:ext cx="226423" cy="217715"/>
+            </a:xfrm>
+            <a:prstGeom prst="star5">
+              <a:avLst/>
+            </a:prstGeom>
+          </p:spPr>
+          <p:style>
+            <a:lnRef idx="0">
+              <a:schemeClr val="accent4"/>
+            </a:lnRef>
+            <a:fillRef idx="3">
+              <a:schemeClr val="accent4"/>
+            </a:fillRef>
+            <a:effectRef idx="3">
+              <a:schemeClr val="accent4"/>
+            </a:effectRef>
+            <a:fontRef idx="minor">
+              <a:schemeClr val="lt1"/>
+            </a:fontRef>
+          </p:style>
+          <p:txBody>
+            <a:bodyPr rtlCol="0" anchor="ctr"/>
+            <a:lstStyle/>
+            <a:p>
+              <a:pPr algn="ctr"/>
+              <a:endParaRPr lang="en-US" dirty="0"/>
+            </a:p>
+          </p:txBody>
+        </p:sp>
+        <p:sp>
+          <p:nvSpPr>
+            <p:cNvPr id="16" name="TextBox 15"/>
+            <p:cNvSpPr txBox="1"/>
+            <p:nvPr/>
+          </p:nvSpPr>
+          <p:spPr>
+            <a:xfrm>
+              <a:off x="8569234" y="5373189"/>
+              <a:ext cx="1093056" cy="369332"/>
+            </a:xfrm>
+            <a:prstGeom prst="rect">
+              <a:avLst/>
+            </a:prstGeom>
+            <a:noFill/>
+          </p:spPr>
+          <p:txBody>
+            <a:bodyPr wrap="none" rtlCol="0">
+              <a:spAutoFit/>
+            </a:bodyPr>
+            <a:lstStyle/>
+            <a:p>
+              <a:r>
+                <a:rPr lang="nl-BE" dirty="0"/>
+                <a:t>Complete</a:t>
+              </a:r>
+              <a:endParaRPr lang="en-US" dirty="0"/>
+            </a:p>
+          </p:txBody>
+        </p:sp>
+      </p:grpSp>
+      <p:sp>
+        <p:nvSpPr>
+          <p:cNvPr id="17" name="TextBox 16"/>
+          <p:cNvSpPr txBox="1"/>
+          <p:nvPr/>
+        </p:nvSpPr>
+        <p:spPr>
+          <a:xfrm>
+            <a:off x="4106221" y="2008833"/>
+            <a:ext cx="904543" cy="646331"/>
+          </a:xfrm>
+          <a:prstGeom prst="rect">
+            <a:avLst/>
+          </a:prstGeom>
+          <a:noFill/>
+        </p:spPr>
+        <p:txBody>
+          <a:bodyPr wrap="none" rtlCol="0">
+            <a:spAutoFit/>
+          </a:bodyPr>
+          <a:lstStyle/>
+          <a:p>
+            <a:r>
+              <a:rPr lang="nl-BE" dirty="0"/>
+              <a:t>Receive</a:t>
+            </a:r>
+          </a:p>
+          <a:p>
+            <a:r>
+              <a:rPr lang="nl-BE" dirty="0"/>
+              <a:t>Scope</a:t>
+            </a:r>
+            <a:endParaRPr lang="en-US" dirty="0"/>
+          </a:p>
+        </p:txBody>
+      </p:sp>
+      <p:grpSp>
+        <p:nvGrpSpPr>
+          <p:cNvPr id="18" name="Group 17"/>
+          <p:cNvGrpSpPr/>
+          <p:nvPr/>
+        </p:nvGrpSpPr>
+        <p:grpSpPr>
+          <a:xfrm>
+            <a:off x="5073347" y="4171798"/>
+            <a:ext cx="1779733" cy="369332"/>
+            <a:chOff x="8342811" y="5373189"/>
+            <a:chExt cx="1779733" cy="369332"/>
+          </a:xfrm>
+        </p:grpSpPr>
+        <p:sp>
+          <p:nvSpPr>
+            <p:cNvPr id="19" name="Star: 5 Points 18"/>
+            <p:cNvSpPr/>
+            <p:nvPr/>
+          </p:nvSpPr>
+          <p:spPr>
+            <a:xfrm>
+              <a:off x="8342811" y="5448997"/>
+              <a:ext cx="226423" cy="217715"/>
+            </a:xfrm>
+            <a:prstGeom prst="star5">
+              <a:avLst/>
+            </a:prstGeom>
+          </p:spPr>
+          <p:style>
+            <a:lnRef idx="0">
+              <a:schemeClr val="accent6"/>
+            </a:lnRef>
+            <a:fillRef idx="3">
+              <a:schemeClr val="accent6"/>
+            </a:fillRef>
+            <a:effectRef idx="3">
+              <a:schemeClr val="accent6"/>
+            </a:effectRef>
+            <a:fontRef idx="minor">
+              <a:schemeClr val="lt1"/>
+            </a:fontRef>
+          </p:style>
+          <p:txBody>
+            <a:bodyPr rtlCol="0" anchor="ctr"/>
+            <a:lstStyle/>
+            <a:p>
+              <a:pPr algn="ctr"/>
+              <a:endParaRPr lang="en-US" dirty="0"/>
+            </a:p>
+          </p:txBody>
+        </p:sp>
+        <p:sp>
+          <p:nvSpPr>
+            <p:cNvPr id="20" name="TextBox 19"/>
+            <p:cNvSpPr txBox="1"/>
+            <p:nvPr/>
+          </p:nvSpPr>
+          <p:spPr>
+            <a:xfrm>
+              <a:off x="8569234" y="5373189"/>
+              <a:ext cx="1553310" cy="369332"/>
+            </a:xfrm>
+            <a:prstGeom prst="rect">
+              <a:avLst/>
+            </a:prstGeom>
+            <a:noFill/>
+          </p:spPr>
+          <p:txBody>
+            <a:bodyPr wrap="none" rtlCol="0">
+              <a:spAutoFit/>
+            </a:bodyPr>
+            <a:lstStyle/>
+            <a:p>
+              <a:r>
+                <a:rPr lang="nl-BE" dirty="0"/>
+                <a:t>DB connection</a:t>
+              </a:r>
+              <a:endParaRPr lang="en-US" dirty="0"/>
+            </a:p>
+          </p:txBody>
+        </p:sp>
+      </p:grpSp>
+      <p:sp>
+        <p:nvSpPr>
+          <p:cNvPr id="21" name="TextBox 20"/>
+          <p:cNvSpPr txBox="1"/>
+          <p:nvPr/>
+        </p:nvSpPr>
+        <p:spPr>
+          <a:xfrm>
+            <a:off x="5301145" y="3917122"/>
+            <a:ext cx="1798060" cy="369332"/>
+          </a:xfrm>
+          <a:prstGeom prst="rect">
+            <a:avLst/>
+          </a:prstGeom>
+          <a:noFill/>
+        </p:spPr>
+        <p:txBody>
+          <a:bodyPr wrap="square" rtlCol="0">
+            <a:spAutoFit/>
+          </a:bodyPr>
+          <a:lstStyle/>
+          <a:p>
+            <a:r>
+              <a:rPr lang="nl-BE" dirty="0"/>
+              <a:t>Behavior Scope</a:t>
+            </a:r>
+            <a:endParaRPr lang="en-US" dirty="0"/>
+          </a:p>
+        </p:txBody>
+      </p:sp>
+      <p:sp>
+        <p:nvSpPr>
+          <p:cNvPr id="24" name="Left Brace 23"/>
+          <p:cNvSpPr/>
+          <p:nvPr/>
+        </p:nvSpPr>
+        <p:spPr>
+          <a:xfrm rot="5400000">
+            <a:off x="4575620" y="3201046"/>
+            <a:ext cx="374469" cy="1119052"/>
+          </a:xfrm>
+          <a:prstGeom prst="leftBrace">
+            <a:avLst/>
+          </a:prstGeom>
+        </p:spPr>
+        <p:style>
+          <a:lnRef idx="3">
+            <a:schemeClr val="dk1"/>
+          </a:lnRef>
+          <a:fillRef idx="0">
+            <a:schemeClr val="dk1"/>
+          </a:fillRef>
+          <a:effectRef idx="2">
+            <a:schemeClr val="dk1"/>
+          </a:effectRef>
+          <a:fontRef idx="minor">
+            <a:schemeClr val="tx1"/>
+          </a:fontRef>
+        </p:style>
+        <p:txBody>
+          <a:bodyPr rtlCol="0" anchor="ctr"/>
+          <a:lstStyle/>
+          <a:p>
+            <a:pPr algn="ctr"/>
+            <a:endParaRPr lang="en-US"/>
+          </a:p>
+        </p:txBody>
+      </p:sp>
+      <p:sp>
+        <p:nvSpPr>
+          <p:cNvPr id="25" name="TextBox 24"/>
+          <p:cNvSpPr txBox="1"/>
+          <p:nvPr/>
+        </p:nvSpPr>
+        <p:spPr>
+          <a:xfrm>
+            <a:off x="5301145" y="3651893"/>
+            <a:ext cx="1687146" cy="369332"/>
+          </a:xfrm>
+          <a:prstGeom prst="rect">
+            <a:avLst/>
+          </a:prstGeom>
+          <a:noFill/>
+        </p:spPr>
+        <p:txBody>
+          <a:bodyPr wrap="square" rtlCol="0">
+            <a:spAutoFit/>
+          </a:bodyPr>
+          <a:lstStyle/>
+          <a:p>
+            <a:r>
+              <a:rPr lang="nl-BE" dirty="0"/>
+              <a:t>Suppress Scope</a:t>
+            </a:r>
+            <a:endParaRPr lang="en-US" dirty="0"/>
+          </a:p>
+        </p:txBody>
+      </p:sp>
+      <p:cxnSp>
+        <p:nvCxnSpPr>
+          <p:cNvPr id="23" name="Straight Connector 22"/>
+          <p:cNvCxnSpPr/>
+          <p:nvPr/>
+        </p:nvCxnSpPr>
+        <p:spPr>
+          <a:xfrm flipV="1">
+            <a:off x="4176867" y="4993667"/>
+            <a:ext cx="5750905" cy="43112"/>
+          </a:xfrm>
+          <a:prstGeom prst="line">
+            <a:avLst/>
+          </a:prstGeom>
+          <a:ln w="9525" cap="flat" cmpd="sng" algn="ctr">
+            <a:solidFill>
+              <a:schemeClr val="dk1"/>
+            </a:solidFill>
+            <a:prstDash val="dash"/>
+            <a:round/>
+            <a:headEnd type="none" w="med" len="med"/>
+            <a:tailEnd type="none" w="med" len="med"/>
+          </a:ln>
+        </p:spPr>
+        <p:style>
+          <a:lnRef idx="0">
+            <a:scrgbClr r="0" g="0" b="0"/>
+          </a:lnRef>
+          <a:fillRef idx="0">
+            <a:scrgbClr r="0" g="0" b="0"/>
+          </a:fillRef>
+          <a:effectRef idx="0">
+            <a:scrgbClr r="0" g="0" b="0"/>
+          </a:effectRef>
+          <a:fontRef idx="minor">
+            <a:schemeClr val="tx1"/>
+          </a:fontRef>
+        </p:style>
+      </p:cxnSp>
+      <p:cxnSp>
+        <p:nvCxnSpPr>
+          <p:cNvPr id="26" name="Straight Connector 25"/>
+          <p:cNvCxnSpPr>
+            <a:cxnSpLocks/>
+          </p:cNvCxnSpPr>
+          <p:nvPr/>
+        </p:nvCxnSpPr>
+        <p:spPr>
+          <a:xfrm flipV="1">
+            <a:off x="6874677" y="3755819"/>
+            <a:ext cx="0" cy="895777"/>
+          </a:xfrm>
+          <a:prstGeom prst="line">
+            <a:avLst/>
+          </a:prstGeom>
+          <a:ln w="9525" cap="flat" cmpd="sng" algn="ctr">
+            <a:solidFill>
+              <a:schemeClr val="dk1"/>
+            </a:solidFill>
+            <a:prstDash val="dash"/>
+            <a:round/>
+            <a:headEnd type="none" w="med" len="med"/>
+            <a:tailEnd type="none" w="med" len="med"/>
+          </a:ln>
+        </p:spPr>
+        <p:style>
+          <a:lnRef idx="0">
+            <a:scrgbClr r="0" g="0" b="0"/>
+          </a:lnRef>
+          <a:fillRef idx="0">
+            <a:scrgbClr r="0" g="0" b="0"/>
+          </a:fillRef>
+          <a:effectRef idx="0">
+            <a:scrgbClr r="0" g="0" b="0"/>
+          </a:effectRef>
+          <a:fontRef idx="minor">
+            <a:schemeClr val="tx1"/>
+          </a:fontRef>
+        </p:style>
+      </p:cxnSp>
+      <p:sp>
+        <p:nvSpPr>
+          <p:cNvPr id="27" name="Rectangle 26"/>
+          <p:cNvSpPr/>
+          <p:nvPr/>
+        </p:nvSpPr>
+        <p:spPr>
+          <a:xfrm>
+            <a:off x="5814081" y="5460270"/>
+            <a:ext cx="3956939" cy="1152254"/>
+          </a:xfrm>
+          <a:prstGeom prst="rect">
+            <a:avLst/>
+          </a:prstGeom>
+          <a:noFill/>
+          <a:ln w="9525" cap="flat" cmpd="sng" algn="ctr">
+            <a:solidFill>
+              <a:schemeClr val="dk1"/>
+            </a:solidFill>
+            <a:prstDash val="solid"/>
+            <a:round/>
+            <a:headEnd type="none" w="med" len="med"/>
+            <a:tailEnd type="none" w="med" len="med"/>
+          </a:ln>
+        </p:spPr>
+        <p:style>
+          <a:lnRef idx="0">
+            <a:scrgbClr r="0" g="0" b="0"/>
+          </a:lnRef>
+          <a:fillRef idx="0">
+            <a:scrgbClr r="0" g="0" b="0"/>
+          </a:fillRef>
+          <a:effectRef idx="0">
+            <a:scrgbClr r="0" g="0" b="0"/>
+          </a:effectRef>
+          <a:fontRef idx="minor">
+            <a:schemeClr val="dk1"/>
+          </a:fontRef>
+        </p:style>
+        <p:txBody>
+          <a:bodyPr rtlCol="0" anchor="t"/>
+          <a:lstStyle/>
+          <a:p>
+            <a:r>
+              <a:rPr lang="nl-BE" dirty="0"/>
+              <a:t>Transaction enlistments</a:t>
+            </a:r>
+            <a:endParaRPr lang="en-US" dirty="0"/>
+          </a:p>
+        </p:txBody>
+      </p:sp>
+      <p:grpSp>
+        <p:nvGrpSpPr>
+          <p:cNvPr id="28" name="Group 27"/>
+          <p:cNvGrpSpPr/>
+          <p:nvPr/>
+        </p:nvGrpSpPr>
+        <p:grpSpPr>
+          <a:xfrm>
+            <a:off x="5997027" y="5730144"/>
+            <a:ext cx="1541911" cy="369332"/>
+            <a:chOff x="8342811" y="5373189"/>
+            <a:chExt cx="1541911" cy="369332"/>
+          </a:xfrm>
+        </p:grpSpPr>
+        <p:sp>
+          <p:nvSpPr>
+            <p:cNvPr id="29" name="Star: 5 Points 28"/>
+            <p:cNvSpPr/>
+            <p:nvPr/>
+          </p:nvSpPr>
+          <p:spPr>
+            <a:xfrm>
+              <a:off x="8342811" y="5448997"/>
+              <a:ext cx="226423" cy="217715"/>
+            </a:xfrm>
+            <a:prstGeom prst="star5">
+              <a:avLst/>
+            </a:prstGeom>
+          </p:spPr>
+          <p:style>
+            <a:lnRef idx="0">
+              <a:schemeClr val="accent6"/>
+            </a:lnRef>
+            <a:fillRef idx="3">
+              <a:schemeClr val="accent6"/>
+            </a:fillRef>
+            <a:effectRef idx="3">
+              <a:schemeClr val="accent6"/>
+            </a:effectRef>
+            <a:fontRef idx="minor">
+              <a:schemeClr val="lt1"/>
+            </a:fontRef>
+          </p:style>
+          <p:txBody>
+            <a:bodyPr rtlCol="0" anchor="ctr"/>
+            <a:lstStyle/>
+            <a:p>
+              <a:pPr algn="ctr"/>
+              <a:endParaRPr lang="en-US" dirty="0"/>
+            </a:p>
+          </p:txBody>
+        </p:sp>
+        <p:sp>
+          <p:nvSpPr>
+            <p:cNvPr id="30" name="TextBox 29"/>
+            <p:cNvSpPr txBox="1"/>
+            <p:nvPr/>
+          </p:nvSpPr>
+          <p:spPr>
+            <a:xfrm>
+              <a:off x="8569234" y="5373189"/>
+              <a:ext cx="1315488" cy="369332"/>
+            </a:xfrm>
+            <a:prstGeom prst="rect">
+              <a:avLst/>
+            </a:prstGeom>
+            <a:noFill/>
+          </p:spPr>
+          <p:txBody>
+            <a:bodyPr wrap="none" rtlCol="0">
+              <a:spAutoFit/>
+            </a:bodyPr>
+            <a:lstStyle/>
+            <a:p>
+              <a:r>
+                <a:rPr lang="nl-BE" dirty="0"/>
+                <a:t>User owned</a:t>
+              </a:r>
+              <a:endParaRPr lang="en-US" dirty="0"/>
+            </a:p>
+          </p:txBody>
+        </p:sp>
+      </p:grpSp>
+      <p:grpSp>
+        <p:nvGrpSpPr>
+          <p:cNvPr id="34" name="Group 33"/>
+          <p:cNvGrpSpPr/>
+          <p:nvPr/>
+        </p:nvGrpSpPr>
+        <p:grpSpPr>
+          <a:xfrm>
+            <a:off x="5997027" y="6088647"/>
+            <a:ext cx="2075904" cy="369332"/>
+            <a:chOff x="8342811" y="5373189"/>
+            <a:chExt cx="2075904" cy="369332"/>
+          </a:xfrm>
+        </p:grpSpPr>
+        <p:sp>
+          <p:nvSpPr>
+            <p:cNvPr id="35" name="Star: 5 Points 34"/>
+            <p:cNvSpPr/>
+            <p:nvPr/>
+          </p:nvSpPr>
+          <p:spPr>
+            <a:xfrm>
+              <a:off x="8342811" y="5448997"/>
+              <a:ext cx="226423" cy="217715"/>
+            </a:xfrm>
+            <a:prstGeom prst="star5">
+              <a:avLst/>
+            </a:prstGeom>
+          </p:spPr>
+          <p:style>
+            <a:lnRef idx="0">
+              <a:schemeClr val="accent4"/>
+            </a:lnRef>
+            <a:fillRef idx="3">
+              <a:schemeClr val="accent4"/>
+            </a:fillRef>
+            <a:effectRef idx="3">
+              <a:schemeClr val="accent4"/>
+            </a:effectRef>
+            <a:fontRef idx="minor">
+              <a:schemeClr val="lt1"/>
+            </a:fontRef>
+          </p:style>
+          <p:txBody>
+            <a:bodyPr rtlCol="0" anchor="ctr"/>
+            <a:lstStyle/>
+            <a:p>
+              <a:pPr algn="ctr"/>
+              <a:endParaRPr lang="en-US" dirty="0"/>
+            </a:p>
+          </p:txBody>
+        </p:sp>
+        <p:sp>
+          <p:nvSpPr>
+            <p:cNvPr id="36" name="TextBox 35"/>
+            <p:cNvSpPr txBox="1"/>
+            <p:nvPr/>
+          </p:nvSpPr>
+          <p:spPr>
+            <a:xfrm>
+              <a:off x="8569234" y="5373189"/>
+              <a:ext cx="1849481" cy="369332"/>
+            </a:xfrm>
+            <a:prstGeom prst="rect">
+              <a:avLst/>
+            </a:prstGeom>
+            <a:noFill/>
+          </p:spPr>
+          <p:txBody>
+            <a:bodyPr wrap="none" rtlCol="0">
+              <a:spAutoFit/>
+            </a:bodyPr>
+            <a:lstStyle/>
+            <a:p>
+              <a:r>
+                <a:rPr lang="nl-BE" dirty="0"/>
+                <a:t>Transport owned</a:t>
+              </a:r>
+              <a:endParaRPr lang="en-US" dirty="0"/>
+            </a:p>
+          </p:txBody>
+        </p:sp>
+      </p:grpSp>
+      <p:sp>
+        <p:nvSpPr>
+          <p:cNvPr id="2" name="Cylinder 1"/>
+          <p:cNvSpPr/>
+          <p:nvPr/>
+        </p:nvSpPr>
+        <p:spPr>
+          <a:xfrm>
+            <a:off x="4583927" y="4246121"/>
+            <a:ext cx="402671" cy="293524"/>
+          </a:xfrm>
+          <a:prstGeom prst="can">
+            <a:avLst/>
+          </a:prstGeom>
+        </p:spPr>
+        <p:style>
+          <a:lnRef idx="1">
+            <a:schemeClr val="accent3"/>
+          </a:lnRef>
+          <a:fillRef idx="2">
+            <a:schemeClr val="accent3"/>
+          </a:fillRef>
+          <a:effectRef idx="1">
+            <a:schemeClr val="accent3"/>
+          </a:effectRef>
+          <a:fontRef idx="minor">
+            <a:schemeClr val="dk1"/>
+          </a:fontRef>
+        </p:style>
+        <p:txBody>
+          <a:bodyPr rtlCol="0" anchor="ctr"/>
+          <a:lstStyle/>
+          <a:p>
+            <a:pPr algn="ctr"/>
+            <a:endParaRPr lang="en-US"/>
+          </a:p>
+        </p:txBody>
+      </p:sp>
+    </p:spTree>
+    <p:extLst>
+      <p:ext uri="{BB962C8B-B14F-4D97-AF65-F5344CB8AC3E}">
+        <p14:creationId xmlns:p14="http://schemas.microsoft.com/office/powerpoint/2010/main" val="1307039991"/>
+      </p:ext>
+    </p:extLst>
+  </p:cSld>
+  <p:clrMapOvr>
+    <a:masterClrMapping/>
+  </p:clrMapOvr>
+</p:sld>
+</file>
+
+<file path=ppt/slides/slide4.xml><?xml version="1.0" encoding="utf-8"?>
 <p:sld xmlns:a="http://schemas.openxmlformats.org/drawingml/2006/main" xmlns:r="http://schemas.openxmlformats.org/officeDocument/2006/relationships" xmlns:p="http://schemas.openxmlformats.org/presentationml/2006/main">
   <p:cSld>
     <p:spTree>

</xml_diff>

<commit_message>
[ASB] Reworded the understanding transaction scope doco to make it more clear (#2660)
* reworded the understanding transaction scope doco to make it more clear

* added note & tldr

* incorporated sean's remark

* added changes suggested by sean

* changed the names of the pipeline sections

* incorporated daniels suggestions

* section -> pipeline

* rewritten the document, hope it makes more sense now

* incorporated daniels feedback

* incorporated sean & bob's feedbakc
</commit_message>
<xml_diff>
--- a/nservicebus/azure-service-bus/Scopes.pptx
+++ b/nservicebus/azure-service-bus/Scopes.pptx
@@ -7,7 +7,8 @@
   <p:sldIdLst>
     <p:sldId id="256" r:id="rId2"/>
     <p:sldId id="257" r:id="rId3"/>
-    <p:sldId id="258" r:id="rId4"/>
+    <p:sldId id="259" r:id="rId4"/>
+    <p:sldId id="258" r:id="rId5"/>
   </p:sldIdLst>
   <p:sldSz cx="12192000" cy="6858000"/>
   <p:notesSz cx="6858000" cy="9144000"/>
@@ -114,6 +115,10 @@
 </p:presentation>
 </file>
 
+<file path=ppt/revisionInfo.xml><?xml version="1.0" encoding="utf-8"?>
+<p1510:revInfo xmlns:a="http://schemas.openxmlformats.org/drawingml/2006/main" xmlns:r="http://schemas.openxmlformats.org/officeDocument/2006/relationships" xmlns:p1510="http://schemas.microsoft.com/office/powerpoint/2015/10/main"/>
+</file>
+
 <file path=ppt/slideLayouts/slideLayout1.xml><?xml version="1.0" encoding="utf-8"?>
 <p:sldLayout xmlns:a="http://schemas.openxmlformats.org/drawingml/2006/main" xmlns:r="http://schemas.openxmlformats.org/officeDocument/2006/relationships" xmlns:p="http://schemas.openxmlformats.org/presentationml/2006/main" type="title" preserve="1">
   <p:cSld name="Title Slide">
@@ -243,7 +248,7 @@
           <a:p>
             <a:fld id="{B16937A6-3F9C-48AA-A395-6B270EACA695}" type="datetimeFigureOut">
               <a:rPr lang="en-US" smtClean="0"/>
-              <a:t>8/12/2016</a:t>
+              <a:t>5/8/2017</a:t>
             </a:fld>
             <a:endParaRPr lang="en-US"/>
           </a:p>
@@ -411,7 +416,7 @@
           <a:p>
             <a:fld id="{B16937A6-3F9C-48AA-A395-6B270EACA695}" type="datetimeFigureOut">
               <a:rPr lang="en-US" smtClean="0"/>
-              <a:t>8/12/2016</a:t>
+              <a:t>5/8/2017</a:t>
             </a:fld>
             <a:endParaRPr lang="en-US"/>
           </a:p>
@@ -589,7 +594,7 @@
           <a:p>
             <a:fld id="{B16937A6-3F9C-48AA-A395-6B270EACA695}" type="datetimeFigureOut">
               <a:rPr lang="en-US" smtClean="0"/>
-              <a:t>8/12/2016</a:t>
+              <a:t>5/8/2017</a:t>
             </a:fld>
             <a:endParaRPr lang="en-US"/>
           </a:p>
@@ -757,7 +762,7 @@
           <a:p>
             <a:fld id="{B16937A6-3F9C-48AA-A395-6B270EACA695}" type="datetimeFigureOut">
               <a:rPr lang="en-US" smtClean="0"/>
-              <a:t>8/12/2016</a:t>
+              <a:t>5/8/2017</a:t>
             </a:fld>
             <a:endParaRPr lang="en-US"/>
           </a:p>
@@ -1002,7 +1007,7 @@
           <a:p>
             <a:fld id="{B16937A6-3F9C-48AA-A395-6B270EACA695}" type="datetimeFigureOut">
               <a:rPr lang="en-US" smtClean="0"/>
-              <a:t>8/12/2016</a:t>
+              <a:t>5/8/2017</a:t>
             </a:fld>
             <a:endParaRPr lang="en-US"/>
           </a:p>
@@ -1231,7 +1236,7 @@
           <a:p>
             <a:fld id="{B16937A6-3F9C-48AA-A395-6B270EACA695}" type="datetimeFigureOut">
               <a:rPr lang="en-US" smtClean="0"/>
-              <a:t>8/12/2016</a:t>
+              <a:t>5/8/2017</a:t>
             </a:fld>
             <a:endParaRPr lang="en-US"/>
           </a:p>
@@ -1595,7 +1600,7 @@
           <a:p>
             <a:fld id="{B16937A6-3F9C-48AA-A395-6B270EACA695}" type="datetimeFigureOut">
               <a:rPr lang="en-US" smtClean="0"/>
-              <a:t>8/12/2016</a:t>
+              <a:t>5/8/2017</a:t>
             </a:fld>
             <a:endParaRPr lang="en-US"/>
           </a:p>
@@ -1712,7 +1717,7 @@
           <a:p>
             <a:fld id="{B16937A6-3F9C-48AA-A395-6B270EACA695}" type="datetimeFigureOut">
               <a:rPr lang="en-US" smtClean="0"/>
-              <a:t>8/12/2016</a:t>
+              <a:t>5/8/2017</a:t>
             </a:fld>
             <a:endParaRPr lang="en-US"/>
           </a:p>
@@ -1807,7 +1812,7 @@
           <a:p>
             <a:fld id="{B16937A6-3F9C-48AA-A395-6B270EACA695}" type="datetimeFigureOut">
               <a:rPr lang="en-US" smtClean="0"/>
-              <a:t>8/12/2016</a:t>
+              <a:t>5/8/2017</a:t>
             </a:fld>
             <a:endParaRPr lang="en-US"/>
           </a:p>
@@ -2082,7 +2087,7 @@
           <a:p>
             <a:fld id="{B16937A6-3F9C-48AA-A395-6B270EACA695}" type="datetimeFigureOut">
               <a:rPr lang="en-US" smtClean="0"/>
-              <a:t>8/12/2016</a:t>
+              <a:t>5/8/2017</a:t>
             </a:fld>
             <a:endParaRPr lang="en-US"/>
           </a:p>
@@ -2334,7 +2339,7 @@
           <a:p>
             <a:fld id="{B16937A6-3F9C-48AA-A395-6B270EACA695}" type="datetimeFigureOut">
               <a:rPr lang="en-US" smtClean="0"/>
-              <a:t>8/12/2016</a:t>
+              <a:t>5/8/2017</a:t>
             </a:fld>
             <a:endParaRPr lang="en-US"/>
           </a:p>
@@ -2545,7 +2550,7 @@
           <a:p>
             <a:fld id="{B16937A6-3F9C-48AA-A395-6B270EACA695}" type="datetimeFigureOut">
               <a:rPr lang="en-US" smtClean="0"/>
-              <a:t>8/12/2016</a:t>
+              <a:t>5/8/2017</a:t>
             </a:fld>
             <a:endParaRPr lang="en-US"/>
           </a:p>
@@ -4264,10 +4269,9 @@
           <a:p>
             <a:pPr algn="ctr"/>
             <a:r>
-              <a:rPr lang="nl-BE" dirty="0"/>
-              <a:t>Pipeline</a:t>
-            </a:r>
-            <a:endParaRPr lang="en-US" dirty="0"/>
+              <a:rPr lang="nl-BE" sz="1400" dirty="0"/>
+              <a:t>Handler Pipeline</a:t>
+            </a:r>
           </a:p>
         </p:txBody>
       </p:sp>
@@ -4390,10 +4394,10 @@
           <a:p>
             <a:pPr algn="ctr"/>
             <a:r>
-              <a:rPr lang="nl-BE" dirty="0"/>
-              <a:t>Pipeline</a:t>
-            </a:r>
-            <a:endParaRPr lang="en-US" dirty="0"/>
+              <a:rPr lang="nl-BE" sz="1400" dirty="0"/>
+              <a:t>Incoming Pipeline</a:t>
+            </a:r>
+            <a:endParaRPr lang="en-US" sz="1400" dirty="0"/>
           </a:p>
         </p:txBody>
       </p:sp>
@@ -4476,10 +4480,10 @@
           <a:p>
             <a:pPr algn="ctr"/>
             <a:r>
-              <a:rPr lang="nl-BE" dirty="0"/>
-              <a:t>Pipeline</a:t>
-            </a:r>
-            <a:endParaRPr lang="en-US" dirty="0"/>
+              <a:rPr lang="nl-BE" sz="1400" dirty="0"/>
+              <a:t>Outgoing Pipeline</a:t>
+            </a:r>
+            <a:endParaRPr lang="en-US" sz="1400" dirty="0"/>
           </a:p>
         </p:txBody>
       </p:sp>
@@ -4535,7 +4539,7 @@
         </p:nvSpPr>
         <p:spPr>
           <a:xfrm>
-            <a:off x="6284830" y="2743888"/>
+            <a:off x="6586798" y="2743888"/>
             <a:ext cx="374469" cy="1119052"/>
           </a:xfrm>
           <a:prstGeom prst="leftBrace">
@@ -4858,7 +4862,7 @@
         </p:nvSpPr>
         <p:spPr>
           <a:xfrm>
-            <a:off x="6729315" y="2344962"/>
+            <a:off x="6888701" y="2344962"/>
             <a:ext cx="931665" cy="646331"/>
           </a:xfrm>
           <a:prstGeom prst="rect">
@@ -5269,6 +5273,1091 @@
 </file>
 
 <file path=ppt/slides/slide3.xml><?xml version="1.0" encoding="utf-8"?>
+<p:sld xmlns:a="http://schemas.openxmlformats.org/drawingml/2006/main" xmlns:r="http://schemas.openxmlformats.org/officeDocument/2006/relationships" xmlns:p="http://schemas.openxmlformats.org/presentationml/2006/main">
+  <p:cSld>
+    <p:spTree>
+      <p:nvGrpSpPr>
+        <p:cNvPr id="1" name=""/>
+        <p:cNvGrpSpPr/>
+        <p:nvPr/>
+      </p:nvGrpSpPr>
+      <p:grpSpPr>
+        <a:xfrm>
+          <a:off x="0" y="0"/>
+          <a:ext cx="0" cy="0"/>
+          <a:chOff x="0" y="0"/>
+          <a:chExt cx="0" cy="0"/>
+        </a:xfrm>
+      </p:grpSpPr>
+      <p:sp>
+        <p:nvSpPr>
+          <p:cNvPr id="22" name="Rectangle 21"/>
+          <p:cNvSpPr/>
+          <p:nvPr/>
+        </p:nvSpPr>
+        <p:spPr>
+          <a:xfrm>
+            <a:off x="6931293" y="3088595"/>
+            <a:ext cx="1280160" cy="610850"/>
+          </a:xfrm>
+          <a:prstGeom prst="rect">
+            <a:avLst/>
+          </a:prstGeom>
+        </p:spPr>
+        <p:style>
+          <a:lnRef idx="2">
+            <a:schemeClr val="accent1">
+              <a:shade val="50000"/>
+            </a:schemeClr>
+          </a:lnRef>
+          <a:fillRef idx="1">
+            <a:schemeClr val="accent1"/>
+          </a:fillRef>
+          <a:effectRef idx="0">
+            <a:schemeClr val="accent1"/>
+          </a:effectRef>
+          <a:fontRef idx="minor">
+            <a:schemeClr val="lt1"/>
+          </a:fontRef>
+        </p:style>
+        <p:txBody>
+          <a:bodyPr rtlCol="0" anchor="ctr"/>
+          <a:lstStyle/>
+          <a:p>
+            <a:pPr algn="ctr"/>
+            <a:r>
+              <a:rPr lang="nl-BE" sz="1400" dirty="0"/>
+              <a:t>Handler Pipeline</a:t>
+            </a:r>
+          </a:p>
+        </p:txBody>
+      </p:sp>
+      <p:sp>
+        <p:nvSpPr>
+          <p:cNvPr id="4" name="Rectangle 3"/>
+          <p:cNvSpPr/>
+          <p:nvPr/>
+        </p:nvSpPr>
+        <p:spPr>
+          <a:xfrm>
+            <a:off x="2664823" y="3091544"/>
+            <a:ext cx="1410788" cy="609600"/>
+          </a:xfrm>
+          <a:prstGeom prst="rect">
+            <a:avLst/>
+          </a:prstGeom>
+        </p:spPr>
+        <p:style>
+          <a:lnRef idx="2">
+            <a:schemeClr val="accent1">
+              <a:shade val="50000"/>
+            </a:schemeClr>
+          </a:lnRef>
+          <a:fillRef idx="1">
+            <a:schemeClr val="accent1"/>
+          </a:fillRef>
+          <a:effectRef idx="0">
+            <a:schemeClr val="accent1"/>
+          </a:effectRef>
+          <a:fontRef idx="minor">
+            <a:schemeClr val="lt1"/>
+          </a:fontRef>
+        </p:style>
+        <p:txBody>
+          <a:bodyPr rtlCol="0" anchor="ctr"/>
+          <a:lstStyle/>
+          <a:p>
+            <a:pPr algn="ctr"/>
+            <a:r>
+              <a:rPr lang="nl-BE" dirty="0"/>
+              <a:t>Transport</a:t>
+            </a:r>
+            <a:endParaRPr lang="en-US" dirty="0"/>
+          </a:p>
+        </p:txBody>
+      </p:sp>
+      <p:sp>
+        <p:nvSpPr>
+          <p:cNvPr id="5" name="Left Brace 4"/>
+          <p:cNvSpPr/>
+          <p:nvPr/>
+        </p:nvSpPr>
+        <p:spPr>
+          <a:xfrm>
+            <a:off x="3796937" y="2582092"/>
+            <a:ext cx="374469" cy="2466821"/>
+          </a:xfrm>
+          <a:prstGeom prst="leftBrace">
+            <a:avLst/>
+          </a:prstGeom>
+        </p:spPr>
+        <p:style>
+          <a:lnRef idx="3">
+            <a:schemeClr val="dk1"/>
+          </a:lnRef>
+          <a:fillRef idx="0">
+            <a:schemeClr val="dk1"/>
+          </a:fillRef>
+          <a:effectRef idx="2">
+            <a:schemeClr val="dk1"/>
+          </a:effectRef>
+          <a:fontRef idx="minor">
+            <a:schemeClr val="tx1"/>
+          </a:fontRef>
+        </p:style>
+        <p:txBody>
+          <a:bodyPr rtlCol="0" anchor="ctr"/>
+          <a:lstStyle/>
+          <a:p>
+            <a:pPr algn="ctr"/>
+            <a:endParaRPr lang="en-US"/>
+          </a:p>
+        </p:txBody>
+      </p:sp>
+      <p:sp>
+        <p:nvSpPr>
+          <p:cNvPr id="6" name="Rectangle 5"/>
+          <p:cNvSpPr/>
+          <p:nvPr/>
+        </p:nvSpPr>
+        <p:spPr>
+          <a:xfrm>
+            <a:off x="4171406" y="3091544"/>
+            <a:ext cx="2664092" cy="609600"/>
+          </a:xfrm>
+          <a:prstGeom prst="rect">
+            <a:avLst/>
+          </a:prstGeom>
+        </p:spPr>
+        <p:style>
+          <a:lnRef idx="2">
+            <a:schemeClr val="accent1">
+              <a:shade val="50000"/>
+            </a:schemeClr>
+          </a:lnRef>
+          <a:fillRef idx="1">
+            <a:schemeClr val="accent1"/>
+          </a:fillRef>
+          <a:effectRef idx="0">
+            <a:schemeClr val="accent1"/>
+          </a:effectRef>
+          <a:fontRef idx="minor">
+            <a:schemeClr val="lt1"/>
+          </a:fontRef>
+        </p:style>
+        <p:txBody>
+          <a:bodyPr rtlCol="0" anchor="ctr"/>
+          <a:lstStyle/>
+          <a:p>
+            <a:pPr algn="ctr"/>
+            <a:r>
+              <a:rPr lang="nl-BE" sz="1400" dirty="0"/>
+              <a:t>Incoming Pipeline</a:t>
+            </a:r>
+            <a:endParaRPr lang="en-US" sz="1400" dirty="0"/>
+          </a:p>
+        </p:txBody>
+      </p:sp>
+      <p:sp>
+        <p:nvSpPr>
+          <p:cNvPr id="7" name="Rectangle 6"/>
+          <p:cNvSpPr/>
+          <p:nvPr/>
+        </p:nvSpPr>
+        <p:spPr>
+          <a:xfrm>
+            <a:off x="8291297" y="3091544"/>
+            <a:ext cx="1410788" cy="609600"/>
+          </a:xfrm>
+          <a:prstGeom prst="rect">
+            <a:avLst/>
+          </a:prstGeom>
+        </p:spPr>
+        <p:style>
+          <a:lnRef idx="2">
+            <a:schemeClr val="accent1"/>
+          </a:lnRef>
+          <a:fillRef idx="1">
+            <a:schemeClr val="lt1"/>
+          </a:fillRef>
+          <a:effectRef idx="0">
+            <a:schemeClr val="accent1"/>
+          </a:effectRef>
+          <a:fontRef idx="minor">
+            <a:schemeClr val="dk1"/>
+          </a:fontRef>
+        </p:style>
+        <p:txBody>
+          <a:bodyPr rtlCol="0" anchor="ctr"/>
+          <a:lstStyle/>
+          <a:p>
+            <a:pPr algn="ctr"/>
+            <a:r>
+              <a:rPr lang="nl-BE" dirty="0"/>
+              <a:t>User Code</a:t>
+            </a:r>
+            <a:endParaRPr lang="en-US" dirty="0"/>
+          </a:p>
+        </p:txBody>
+      </p:sp>
+      <p:sp>
+        <p:nvSpPr>
+          <p:cNvPr id="8" name="Rectangle 7"/>
+          <p:cNvSpPr/>
+          <p:nvPr/>
+        </p:nvSpPr>
+        <p:spPr>
+          <a:xfrm>
+            <a:off x="6931293" y="3951732"/>
+            <a:ext cx="1385398" cy="609600"/>
+          </a:xfrm>
+          <a:prstGeom prst="rect">
+            <a:avLst/>
+          </a:prstGeom>
+        </p:spPr>
+        <p:style>
+          <a:lnRef idx="2">
+            <a:schemeClr val="accent1">
+              <a:shade val="50000"/>
+            </a:schemeClr>
+          </a:lnRef>
+          <a:fillRef idx="1">
+            <a:schemeClr val="accent1"/>
+          </a:fillRef>
+          <a:effectRef idx="0">
+            <a:schemeClr val="accent1"/>
+          </a:effectRef>
+          <a:fontRef idx="minor">
+            <a:schemeClr val="lt1"/>
+          </a:fontRef>
+        </p:style>
+        <p:txBody>
+          <a:bodyPr rtlCol="0" anchor="ctr"/>
+          <a:lstStyle/>
+          <a:p>
+            <a:pPr algn="ctr"/>
+            <a:r>
+              <a:rPr lang="nl-BE" sz="1400" dirty="0"/>
+              <a:t>Outgoing Pipeline</a:t>
+            </a:r>
+            <a:endParaRPr lang="en-US" sz="1400" dirty="0"/>
+          </a:p>
+        </p:txBody>
+      </p:sp>
+      <p:sp>
+        <p:nvSpPr>
+          <p:cNvPr id="9" name="Rectangle 8"/>
+          <p:cNvSpPr/>
+          <p:nvPr/>
+        </p:nvSpPr>
+        <p:spPr>
+          <a:xfrm>
+            <a:off x="8360232" y="3941321"/>
+            <a:ext cx="1410788" cy="609600"/>
+          </a:xfrm>
+          <a:prstGeom prst="rect">
+            <a:avLst/>
+          </a:prstGeom>
+        </p:spPr>
+        <p:style>
+          <a:lnRef idx="2">
+            <a:schemeClr val="accent1">
+              <a:shade val="50000"/>
+            </a:schemeClr>
+          </a:lnRef>
+          <a:fillRef idx="1">
+            <a:schemeClr val="accent1"/>
+          </a:fillRef>
+          <a:effectRef idx="0">
+            <a:schemeClr val="accent1"/>
+          </a:effectRef>
+          <a:fontRef idx="minor">
+            <a:schemeClr val="lt1"/>
+          </a:fontRef>
+        </p:style>
+        <p:txBody>
+          <a:bodyPr rtlCol="0" anchor="ctr"/>
+          <a:lstStyle/>
+          <a:p>
+            <a:pPr algn="ctr"/>
+            <a:r>
+              <a:rPr lang="nl-BE" dirty="0"/>
+              <a:t>Transport</a:t>
+            </a:r>
+            <a:endParaRPr lang="en-US" dirty="0"/>
+          </a:p>
+        </p:txBody>
+      </p:sp>
+      <p:sp>
+        <p:nvSpPr>
+          <p:cNvPr id="10" name="Left Brace 9"/>
+          <p:cNvSpPr/>
+          <p:nvPr/>
+        </p:nvSpPr>
+        <p:spPr>
+          <a:xfrm rot="5400000">
+            <a:off x="4576204" y="3491425"/>
+            <a:ext cx="374469" cy="1119052"/>
+          </a:xfrm>
+          <a:prstGeom prst="leftBrace">
+            <a:avLst/>
+          </a:prstGeom>
+        </p:spPr>
+        <p:style>
+          <a:lnRef idx="3">
+            <a:schemeClr val="dk1"/>
+          </a:lnRef>
+          <a:fillRef idx="0">
+            <a:schemeClr val="dk1"/>
+          </a:fillRef>
+          <a:effectRef idx="2">
+            <a:schemeClr val="dk1"/>
+          </a:effectRef>
+          <a:fontRef idx="minor">
+            <a:schemeClr val="tx1"/>
+          </a:fontRef>
+        </p:style>
+        <p:txBody>
+          <a:bodyPr rtlCol="0" anchor="ctr"/>
+          <a:lstStyle/>
+          <a:p>
+            <a:pPr algn="ctr"/>
+            <a:endParaRPr lang="en-US"/>
+          </a:p>
+        </p:txBody>
+      </p:sp>
+      <p:grpSp>
+        <p:nvGrpSpPr>
+          <p:cNvPr id="11" name="Group 10"/>
+          <p:cNvGrpSpPr/>
+          <p:nvPr/>
+        </p:nvGrpSpPr>
+        <p:grpSpPr>
+          <a:xfrm>
+            <a:off x="9216281" y="4493957"/>
+            <a:ext cx="1196560" cy="369332"/>
+            <a:chOff x="8342811" y="5373189"/>
+            <a:chExt cx="1196560" cy="369332"/>
+          </a:xfrm>
+        </p:grpSpPr>
+        <p:sp>
+          <p:nvSpPr>
+            <p:cNvPr id="12" name="Star: 5 Points 11"/>
+            <p:cNvSpPr/>
+            <p:nvPr/>
+          </p:nvSpPr>
+          <p:spPr>
+            <a:xfrm>
+              <a:off x="8342811" y="5448997"/>
+              <a:ext cx="226423" cy="217715"/>
+            </a:xfrm>
+            <a:prstGeom prst="star5">
+              <a:avLst/>
+            </a:prstGeom>
+          </p:spPr>
+          <p:style>
+            <a:lnRef idx="0">
+              <a:schemeClr val="accent4"/>
+            </a:lnRef>
+            <a:fillRef idx="3">
+              <a:schemeClr val="accent4"/>
+            </a:fillRef>
+            <a:effectRef idx="3">
+              <a:schemeClr val="accent4"/>
+            </a:effectRef>
+            <a:fontRef idx="minor">
+              <a:schemeClr val="lt1"/>
+            </a:fontRef>
+          </p:style>
+          <p:txBody>
+            <a:bodyPr rtlCol="0" anchor="ctr"/>
+            <a:lstStyle/>
+            <a:p>
+              <a:pPr algn="ctr"/>
+              <a:endParaRPr lang="en-US" dirty="0"/>
+            </a:p>
+          </p:txBody>
+        </p:sp>
+        <p:sp>
+          <p:nvSpPr>
+            <p:cNvPr id="13" name="TextBox 12"/>
+            <p:cNvSpPr txBox="1"/>
+            <p:nvPr/>
+          </p:nvSpPr>
+          <p:spPr>
+            <a:xfrm>
+              <a:off x="8569234" y="5373189"/>
+              <a:ext cx="970137" cy="369332"/>
+            </a:xfrm>
+            <a:prstGeom prst="rect">
+              <a:avLst/>
+            </a:prstGeom>
+            <a:noFill/>
+          </p:spPr>
+          <p:txBody>
+            <a:bodyPr wrap="none" rtlCol="0">
+              <a:spAutoFit/>
+            </a:bodyPr>
+            <a:lstStyle/>
+            <a:p>
+              <a:r>
+                <a:rPr lang="nl-BE" dirty="0"/>
+                <a:t>Send via</a:t>
+              </a:r>
+              <a:endParaRPr lang="en-US" dirty="0"/>
+            </a:p>
+          </p:txBody>
+        </p:sp>
+      </p:grpSp>
+      <p:grpSp>
+        <p:nvGrpSpPr>
+          <p:cNvPr id="14" name="Group 13"/>
+          <p:cNvGrpSpPr/>
+          <p:nvPr/>
+        </p:nvGrpSpPr>
+        <p:grpSpPr>
+          <a:xfrm>
+            <a:off x="4151746" y="4678624"/>
+            <a:ext cx="1319479" cy="369332"/>
+            <a:chOff x="8342811" y="5373189"/>
+            <a:chExt cx="1319479" cy="369332"/>
+          </a:xfrm>
+        </p:grpSpPr>
+        <p:sp>
+          <p:nvSpPr>
+            <p:cNvPr id="15" name="Star: 5 Points 14"/>
+            <p:cNvSpPr/>
+            <p:nvPr/>
+          </p:nvSpPr>
+          <p:spPr>
+            <a:xfrm>
+              <a:off x="8342811" y="5448997"/>
+              <a:ext cx="226423" cy="217715"/>
+            </a:xfrm>
+            <a:prstGeom prst="star5">
+              <a:avLst/>
+            </a:prstGeom>
+          </p:spPr>
+          <p:style>
+            <a:lnRef idx="0">
+              <a:schemeClr val="accent4"/>
+            </a:lnRef>
+            <a:fillRef idx="3">
+              <a:schemeClr val="accent4"/>
+            </a:fillRef>
+            <a:effectRef idx="3">
+              <a:schemeClr val="accent4"/>
+            </a:effectRef>
+            <a:fontRef idx="minor">
+              <a:schemeClr val="lt1"/>
+            </a:fontRef>
+          </p:style>
+          <p:txBody>
+            <a:bodyPr rtlCol="0" anchor="ctr"/>
+            <a:lstStyle/>
+            <a:p>
+              <a:pPr algn="ctr"/>
+              <a:endParaRPr lang="en-US" dirty="0"/>
+            </a:p>
+          </p:txBody>
+        </p:sp>
+        <p:sp>
+          <p:nvSpPr>
+            <p:cNvPr id="16" name="TextBox 15"/>
+            <p:cNvSpPr txBox="1"/>
+            <p:nvPr/>
+          </p:nvSpPr>
+          <p:spPr>
+            <a:xfrm>
+              <a:off x="8569234" y="5373189"/>
+              <a:ext cx="1093056" cy="369332"/>
+            </a:xfrm>
+            <a:prstGeom prst="rect">
+              <a:avLst/>
+            </a:prstGeom>
+            <a:noFill/>
+          </p:spPr>
+          <p:txBody>
+            <a:bodyPr wrap="none" rtlCol="0">
+              <a:spAutoFit/>
+            </a:bodyPr>
+            <a:lstStyle/>
+            <a:p>
+              <a:r>
+                <a:rPr lang="nl-BE" dirty="0"/>
+                <a:t>Complete</a:t>
+              </a:r>
+              <a:endParaRPr lang="en-US" dirty="0"/>
+            </a:p>
+          </p:txBody>
+        </p:sp>
+      </p:grpSp>
+      <p:sp>
+        <p:nvSpPr>
+          <p:cNvPr id="17" name="TextBox 16"/>
+          <p:cNvSpPr txBox="1"/>
+          <p:nvPr/>
+        </p:nvSpPr>
+        <p:spPr>
+          <a:xfrm>
+            <a:off x="4106221" y="2008833"/>
+            <a:ext cx="904543" cy="646331"/>
+          </a:xfrm>
+          <a:prstGeom prst="rect">
+            <a:avLst/>
+          </a:prstGeom>
+          <a:noFill/>
+        </p:spPr>
+        <p:txBody>
+          <a:bodyPr wrap="none" rtlCol="0">
+            <a:spAutoFit/>
+          </a:bodyPr>
+          <a:lstStyle/>
+          <a:p>
+            <a:r>
+              <a:rPr lang="nl-BE" dirty="0"/>
+              <a:t>Receive</a:t>
+            </a:r>
+          </a:p>
+          <a:p>
+            <a:r>
+              <a:rPr lang="nl-BE" dirty="0"/>
+              <a:t>Scope</a:t>
+            </a:r>
+            <a:endParaRPr lang="en-US" dirty="0"/>
+          </a:p>
+        </p:txBody>
+      </p:sp>
+      <p:grpSp>
+        <p:nvGrpSpPr>
+          <p:cNvPr id="18" name="Group 17"/>
+          <p:cNvGrpSpPr/>
+          <p:nvPr/>
+        </p:nvGrpSpPr>
+        <p:grpSpPr>
+          <a:xfrm>
+            <a:off x="5073347" y="4171798"/>
+            <a:ext cx="1779733" cy="369332"/>
+            <a:chOff x="8342811" y="5373189"/>
+            <a:chExt cx="1779733" cy="369332"/>
+          </a:xfrm>
+        </p:grpSpPr>
+        <p:sp>
+          <p:nvSpPr>
+            <p:cNvPr id="19" name="Star: 5 Points 18"/>
+            <p:cNvSpPr/>
+            <p:nvPr/>
+          </p:nvSpPr>
+          <p:spPr>
+            <a:xfrm>
+              <a:off x="8342811" y="5448997"/>
+              <a:ext cx="226423" cy="217715"/>
+            </a:xfrm>
+            <a:prstGeom prst="star5">
+              <a:avLst/>
+            </a:prstGeom>
+          </p:spPr>
+          <p:style>
+            <a:lnRef idx="0">
+              <a:schemeClr val="accent6"/>
+            </a:lnRef>
+            <a:fillRef idx="3">
+              <a:schemeClr val="accent6"/>
+            </a:fillRef>
+            <a:effectRef idx="3">
+              <a:schemeClr val="accent6"/>
+            </a:effectRef>
+            <a:fontRef idx="minor">
+              <a:schemeClr val="lt1"/>
+            </a:fontRef>
+          </p:style>
+          <p:txBody>
+            <a:bodyPr rtlCol="0" anchor="ctr"/>
+            <a:lstStyle/>
+            <a:p>
+              <a:pPr algn="ctr"/>
+              <a:endParaRPr lang="en-US" dirty="0"/>
+            </a:p>
+          </p:txBody>
+        </p:sp>
+        <p:sp>
+          <p:nvSpPr>
+            <p:cNvPr id="20" name="TextBox 19"/>
+            <p:cNvSpPr txBox="1"/>
+            <p:nvPr/>
+          </p:nvSpPr>
+          <p:spPr>
+            <a:xfrm>
+              <a:off x="8569234" y="5373189"/>
+              <a:ext cx="1553310" cy="369332"/>
+            </a:xfrm>
+            <a:prstGeom prst="rect">
+              <a:avLst/>
+            </a:prstGeom>
+            <a:noFill/>
+          </p:spPr>
+          <p:txBody>
+            <a:bodyPr wrap="none" rtlCol="0">
+              <a:spAutoFit/>
+            </a:bodyPr>
+            <a:lstStyle/>
+            <a:p>
+              <a:r>
+                <a:rPr lang="nl-BE" dirty="0"/>
+                <a:t>DB connection</a:t>
+              </a:r>
+              <a:endParaRPr lang="en-US" dirty="0"/>
+            </a:p>
+          </p:txBody>
+        </p:sp>
+      </p:grpSp>
+      <p:sp>
+        <p:nvSpPr>
+          <p:cNvPr id="21" name="TextBox 20"/>
+          <p:cNvSpPr txBox="1"/>
+          <p:nvPr/>
+        </p:nvSpPr>
+        <p:spPr>
+          <a:xfrm>
+            <a:off x="5301145" y="3917122"/>
+            <a:ext cx="1798060" cy="369332"/>
+          </a:xfrm>
+          <a:prstGeom prst="rect">
+            <a:avLst/>
+          </a:prstGeom>
+          <a:noFill/>
+        </p:spPr>
+        <p:txBody>
+          <a:bodyPr wrap="square" rtlCol="0">
+            <a:spAutoFit/>
+          </a:bodyPr>
+          <a:lstStyle/>
+          <a:p>
+            <a:r>
+              <a:rPr lang="nl-BE" dirty="0"/>
+              <a:t>Behavior Scope</a:t>
+            </a:r>
+            <a:endParaRPr lang="en-US" dirty="0"/>
+          </a:p>
+        </p:txBody>
+      </p:sp>
+      <p:sp>
+        <p:nvSpPr>
+          <p:cNvPr id="24" name="Left Brace 23"/>
+          <p:cNvSpPr/>
+          <p:nvPr/>
+        </p:nvSpPr>
+        <p:spPr>
+          <a:xfrm rot="5400000">
+            <a:off x="4575620" y="3201046"/>
+            <a:ext cx="374469" cy="1119052"/>
+          </a:xfrm>
+          <a:prstGeom prst="leftBrace">
+            <a:avLst/>
+          </a:prstGeom>
+        </p:spPr>
+        <p:style>
+          <a:lnRef idx="3">
+            <a:schemeClr val="dk1"/>
+          </a:lnRef>
+          <a:fillRef idx="0">
+            <a:schemeClr val="dk1"/>
+          </a:fillRef>
+          <a:effectRef idx="2">
+            <a:schemeClr val="dk1"/>
+          </a:effectRef>
+          <a:fontRef idx="minor">
+            <a:schemeClr val="tx1"/>
+          </a:fontRef>
+        </p:style>
+        <p:txBody>
+          <a:bodyPr rtlCol="0" anchor="ctr"/>
+          <a:lstStyle/>
+          <a:p>
+            <a:pPr algn="ctr"/>
+            <a:endParaRPr lang="en-US"/>
+          </a:p>
+        </p:txBody>
+      </p:sp>
+      <p:sp>
+        <p:nvSpPr>
+          <p:cNvPr id="25" name="TextBox 24"/>
+          <p:cNvSpPr txBox="1"/>
+          <p:nvPr/>
+        </p:nvSpPr>
+        <p:spPr>
+          <a:xfrm>
+            <a:off x="5301145" y="3651893"/>
+            <a:ext cx="1687146" cy="369332"/>
+          </a:xfrm>
+          <a:prstGeom prst="rect">
+            <a:avLst/>
+          </a:prstGeom>
+          <a:noFill/>
+        </p:spPr>
+        <p:txBody>
+          <a:bodyPr wrap="square" rtlCol="0">
+            <a:spAutoFit/>
+          </a:bodyPr>
+          <a:lstStyle/>
+          <a:p>
+            <a:r>
+              <a:rPr lang="nl-BE" dirty="0"/>
+              <a:t>Suppress Scope</a:t>
+            </a:r>
+            <a:endParaRPr lang="en-US" dirty="0"/>
+          </a:p>
+        </p:txBody>
+      </p:sp>
+      <p:cxnSp>
+        <p:nvCxnSpPr>
+          <p:cNvPr id="23" name="Straight Connector 22"/>
+          <p:cNvCxnSpPr/>
+          <p:nvPr/>
+        </p:nvCxnSpPr>
+        <p:spPr>
+          <a:xfrm flipV="1">
+            <a:off x="4176867" y="4993667"/>
+            <a:ext cx="5750905" cy="43112"/>
+          </a:xfrm>
+          <a:prstGeom prst="line">
+            <a:avLst/>
+          </a:prstGeom>
+          <a:ln w="9525" cap="flat" cmpd="sng" algn="ctr">
+            <a:solidFill>
+              <a:schemeClr val="dk1"/>
+            </a:solidFill>
+            <a:prstDash val="dash"/>
+            <a:round/>
+            <a:headEnd type="none" w="med" len="med"/>
+            <a:tailEnd type="none" w="med" len="med"/>
+          </a:ln>
+        </p:spPr>
+        <p:style>
+          <a:lnRef idx="0">
+            <a:scrgbClr r="0" g="0" b="0"/>
+          </a:lnRef>
+          <a:fillRef idx="0">
+            <a:scrgbClr r="0" g="0" b="0"/>
+          </a:fillRef>
+          <a:effectRef idx="0">
+            <a:scrgbClr r="0" g="0" b="0"/>
+          </a:effectRef>
+          <a:fontRef idx="minor">
+            <a:schemeClr val="tx1"/>
+          </a:fontRef>
+        </p:style>
+      </p:cxnSp>
+      <p:cxnSp>
+        <p:nvCxnSpPr>
+          <p:cNvPr id="26" name="Straight Connector 25"/>
+          <p:cNvCxnSpPr>
+            <a:cxnSpLocks/>
+          </p:cNvCxnSpPr>
+          <p:nvPr/>
+        </p:nvCxnSpPr>
+        <p:spPr>
+          <a:xfrm flipV="1">
+            <a:off x="6874677" y="3755819"/>
+            <a:ext cx="0" cy="895777"/>
+          </a:xfrm>
+          <a:prstGeom prst="line">
+            <a:avLst/>
+          </a:prstGeom>
+          <a:ln w="9525" cap="flat" cmpd="sng" algn="ctr">
+            <a:solidFill>
+              <a:schemeClr val="dk1"/>
+            </a:solidFill>
+            <a:prstDash val="dash"/>
+            <a:round/>
+            <a:headEnd type="none" w="med" len="med"/>
+            <a:tailEnd type="none" w="med" len="med"/>
+          </a:ln>
+        </p:spPr>
+        <p:style>
+          <a:lnRef idx="0">
+            <a:scrgbClr r="0" g="0" b="0"/>
+          </a:lnRef>
+          <a:fillRef idx="0">
+            <a:scrgbClr r="0" g="0" b="0"/>
+          </a:fillRef>
+          <a:effectRef idx="0">
+            <a:scrgbClr r="0" g="0" b="0"/>
+          </a:effectRef>
+          <a:fontRef idx="minor">
+            <a:schemeClr val="tx1"/>
+          </a:fontRef>
+        </p:style>
+      </p:cxnSp>
+      <p:sp>
+        <p:nvSpPr>
+          <p:cNvPr id="27" name="Rectangle 26"/>
+          <p:cNvSpPr/>
+          <p:nvPr/>
+        </p:nvSpPr>
+        <p:spPr>
+          <a:xfrm>
+            <a:off x="5814081" y="5460270"/>
+            <a:ext cx="3956939" cy="1152254"/>
+          </a:xfrm>
+          <a:prstGeom prst="rect">
+            <a:avLst/>
+          </a:prstGeom>
+          <a:noFill/>
+          <a:ln w="9525" cap="flat" cmpd="sng" algn="ctr">
+            <a:solidFill>
+              <a:schemeClr val="dk1"/>
+            </a:solidFill>
+            <a:prstDash val="solid"/>
+            <a:round/>
+            <a:headEnd type="none" w="med" len="med"/>
+            <a:tailEnd type="none" w="med" len="med"/>
+          </a:ln>
+        </p:spPr>
+        <p:style>
+          <a:lnRef idx="0">
+            <a:scrgbClr r="0" g="0" b="0"/>
+          </a:lnRef>
+          <a:fillRef idx="0">
+            <a:scrgbClr r="0" g="0" b="0"/>
+          </a:fillRef>
+          <a:effectRef idx="0">
+            <a:scrgbClr r="0" g="0" b="0"/>
+          </a:effectRef>
+          <a:fontRef idx="minor">
+            <a:schemeClr val="dk1"/>
+          </a:fontRef>
+        </p:style>
+        <p:txBody>
+          <a:bodyPr rtlCol="0" anchor="t"/>
+          <a:lstStyle/>
+          <a:p>
+            <a:r>
+              <a:rPr lang="nl-BE" dirty="0"/>
+              <a:t>Transaction enlistments</a:t>
+            </a:r>
+            <a:endParaRPr lang="en-US" dirty="0"/>
+          </a:p>
+        </p:txBody>
+      </p:sp>
+      <p:grpSp>
+        <p:nvGrpSpPr>
+          <p:cNvPr id="28" name="Group 27"/>
+          <p:cNvGrpSpPr/>
+          <p:nvPr/>
+        </p:nvGrpSpPr>
+        <p:grpSpPr>
+          <a:xfrm>
+            <a:off x="5997027" y="5730144"/>
+            <a:ext cx="1541911" cy="369332"/>
+            <a:chOff x="8342811" y="5373189"/>
+            <a:chExt cx="1541911" cy="369332"/>
+          </a:xfrm>
+        </p:grpSpPr>
+        <p:sp>
+          <p:nvSpPr>
+            <p:cNvPr id="29" name="Star: 5 Points 28"/>
+            <p:cNvSpPr/>
+            <p:nvPr/>
+          </p:nvSpPr>
+          <p:spPr>
+            <a:xfrm>
+              <a:off x="8342811" y="5448997"/>
+              <a:ext cx="226423" cy="217715"/>
+            </a:xfrm>
+            <a:prstGeom prst="star5">
+              <a:avLst/>
+            </a:prstGeom>
+          </p:spPr>
+          <p:style>
+            <a:lnRef idx="0">
+              <a:schemeClr val="accent6"/>
+            </a:lnRef>
+            <a:fillRef idx="3">
+              <a:schemeClr val="accent6"/>
+            </a:fillRef>
+            <a:effectRef idx="3">
+              <a:schemeClr val="accent6"/>
+            </a:effectRef>
+            <a:fontRef idx="minor">
+              <a:schemeClr val="lt1"/>
+            </a:fontRef>
+          </p:style>
+          <p:txBody>
+            <a:bodyPr rtlCol="0" anchor="ctr"/>
+            <a:lstStyle/>
+            <a:p>
+              <a:pPr algn="ctr"/>
+              <a:endParaRPr lang="en-US" dirty="0"/>
+            </a:p>
+          </p:txBody>
+        </p:sp>
+        <p:sp>
+          <p:nvSpPr>
+            <p:cNvPr id="30" name="TextBox 29"/>
+            <p:cNvSpPr txBox="1"/>
+            <p:nvPr/>
+          </p:nvSpPr>
+          <p:spPr>
+            <a:xfrm>
+              <a:off x="8569234" y="5373189"/>
+              <a:ext cx="1315488" cy="369332"/>
+            </a:xfrm>
+            <a:prstGeom prst="rect">
+              <a:avLst/>
+            </a:prstGeom>
+            <a:noFill/>
+          </p:spPr>
+          <p:txBody>
+            <a:bodyPr wrap="none" rtlCol="0">
+              <a:spAutoFit/>
+            </a:bodyPr>
+            <a:lstStyle/>
+            <a:p>
+              <a:r>
+                <a:rPr lang="nl-BE" dirty="0"/>
+                <a:t>User owned</a:t>
+              </a:r>
+              <a:endParaRPr lang="en-US" dirty="0"/>
+            </a:p>
+          </p:txBody>
+        </p:sp>
+      </p:grpSp>
+      <p:grpSp>
+        <p:nvGrpSpPr>
+          <p:cNvPr id="34" name="Group 33"/>
+          <p:cNvGrpSpPr/>
+          <p:nvPr/>
+        </p:nvGrpSpPr>
+        <p:grpSpPr>
+          <a:xfrm>
+            <a:off x="5997027" y="6088647"/>
+            <a:ext cx="2075904" cy="369332"/>
+            <a:chOff x="8342811" y="5373189"/>
+            <a:chExt cx="2075904" cy="369332"/>
+          </a:xfrm>
+        </p:grpSpPr>
+        <p:sp>
+          <p:nvSpPr>
+            <p:cNvPr id="35" name="Star: 5 Points 34"/>
+            <p:cNvSpPr/>
+            <p:nvPr/>
+          </p:nvSpPr>
+          <p:spPr>
+            <a:xfrm>
+              <a:off x="8342811" y="5448997"/>
+              <a:ext cx="226423" cy="217715"/>
+            </a:xfrm>
+            <a:prstGeom prst="star5">
+              <a:avLst/>
+            </a:prstGeom>
+          </p:spPr>
+          <p:style>
+            <a:lnRef idx="0">
+              <a:schemeClr val="accent4"/>
+            </a:lnRef>
+            <a:fillRef idx="3">
+              <a:schemeClr val="accent4"/>
+            </a:fillRef>
+            <a:effectRef idx="3">
+              <a:schemeClr val="accent4"/>
+            </a:effectRef>
+            <a:fontRef idx="minor">
+              <a:schemeClr val="lt1"/>
+            </a:fontRef>
+          </p:style>
+          <p:txBody>
+            <a:bodyPr rtlCol="0" anchor="ctr"/>
+            <a:lstStyle/>
+            <a:p>
+              <a:pPr algn="ctr"/>
+              <a:endParaRPr lang="en-US" dirty="0"/>
+            </a:p>
+          </p:txBody>
+        </p:sp>
+        <p:sp>
+          <p:nvSpPr>
+            <p:cNvPr id="36" name="TextBox 35"/>
+            <p:cNvSpPr txBox="1"/>
+            <p:nvPr/>
+          </p:nvSpPr>
+          <p:spPr>
+            <a:xfrm>
+              <a:off x="8569234" y="5373189"/>
+              <a:ext cx="1849481" cy="369332"/>
+            </a:xfrm>
+            <a:prstGeom prst="rect">
+              <a:avLst/>
+            </a:prstGeom>
+            <a:noFill/>
+          </p:spPr>
+          <p:txBody>
+            <a:bodyPr wrap="none" rtlCol="0">
+              <a:spAutoFit/>
+            </a:bodyPr>
+            <a:lstStyle/>
+            <a:p>
+              <a:r>
+                <a:rPr lang="nl-BE" dirty="0"/>
+                <a:t>Transport owned</a:t>
+              </a:r>
+              <a:endParaRPr lang="en-US" dirty="0"/>
+            </a:p>
+          </p:txBody>
+        </p:sp>
+      </p:grpSp>
+      <p:sp>
+        <p:nvSpPr>
+          <p:cNvPr id="2" name="Cylinder 1"/>
+          <p:cNvSpPr/>
+          <p:nvPr/>
+        </p:nvSpPr>
+        <p:spPr>
+          <a:xfrm>
+            <a:off x="4583927" y="4246121"/>
+            <a:ext cx="402671" cy="293524"/>
+          </a:xfrm>
+          <a:prstGeom prst="can">
+            <a:avLst/>
+          </a:prstGeom>
+        </p:spPr>
+        <p:style>
+          <a:lnRef idx="1">
+            <a:schemeClr val="accent3"/>
+          </a:lnRef>
+          <a:fillRef idx="2">
+            <a:schemeClr val="accent3"/>
+          </a:fillRef>
+          <a:effectRef idx="1">
+            <a:schemeClr val="accent3"/>
+          </a:effectRef>
+          <a:fontRef idx="minor">
+            <a:schemeClr val="dk1"/>
+          </a:fontRef>
+        </p:style>
+        <p:txBody>
+          <a:bodyPr rtlCol="0" anchor="ctr"/>
+          <a:lstStyle/>
+          <a:p>
+            <a:pPr algn="ctr"/>
+            <a:endParaRPr lang="en-US"/>
+          </a:p>
+        </p:txBody>
+      </p:sp>
+    </p:spTree>
+    <p:extLst>
+      <p:ext uri="{BB962C8B-B14F-4D97-AF65-F5344CB8AC3E}">
+        <p14:creationId xmlns:p14="http://schemas.microsoft.com/office/powerpoint/2010/main" val="1307039991"/>
+      </p:ext>
+    </p:extLst>
+  </p:cSld>
+  <p:clrMapOvr>
+    <a:masterClrMapping/>
+  </p:clrMapOvr>
+</p:sld>
+</file>
+
+<file path=ppt/slides/slide4.xml><?xml version="1.0" encoding="utf-8"?>
 <p:sld xmlns:a="http://schemas.openxmlformats.org/drawingml/2006/main" xmlns:r="http://schemas.openxmlformats.org/officeDocument/2006/relationships" xmlns:p="http://schemas.openxmlformats.org/presentationml/2006/main">
   <p:cSld>
     <p:spTree>

</xml_diff>